<commit_message>
presentation and doc updates
</commit_message>
<xml_diff>
--- a/PUISI_Kowalska_Suchta.pptx
+++ b/PUISI_Kowalska_Suchta.pptx
@@ -5,10 +5,10 @@
     <p:sldMasterId id="2147483660" r:id="rId1"/>
   </p:sldMasterIdLst>
   <p:notesMasterIdLst>
-    <p:notesMasterId r:id="rId20"/>
+    <p:notesMasterId r:id="rId27"/>
   </p:notesMasterIdLst>
   <p:handoutMasterIdLst>
-    <p:handoutMasterId r:id="rId21"/>
+    <p:handoutMasterId r:id="rId28"/>
   </p:handoutMasterIdLst>
   <p:sldIdLst>
     <p:sldId id="392" r:id="rId2"/>
@@ -22,13 +22,20 @@
     <p:sldId id="401" r:id="rId10"/>
     <p:sldId id="402" r:id="rId11"/>
     <p:sldId id="403" r:id="rId12"/>
-    <p:sldId id="405" r:id="rId13"/>
-    <p:sldId id="404" r:id="rId14"/>
-    <p:sldId id="406" r:id="rId15"/>
-    <p:sldId id="407" r:id="rId16"/>
-    <p:sldId id="408" r:id="rId17"/>
-    <p:sldId id="409" r:id="rId18"/>
-    <p:sldId id="321" r:id="rId19"/>
+    <p:sldId id="410" r:id="rId13"/>
+    <p:sldId id="411" r:id="rId14"/>
+    <p:sldId id="404" r:id="rId15"/>
+    <p:sldId id="406" r:id="rId16"/>
+    <p:sldId id="407" r:id="rId17"/>
+    <p:sldId id="412" r:id="rId18"/>
+    <p:sldId id="408" r:id="rId19"/>
+    <p:sldId id="409" r:id="rId20"/>
+    <p:sldId id="415" r:id="rId21"/>
+    <p:sldId id="414" r:id="rId22"/>
+    <p:sldId id="413" r:id="rId23"/>
+    <p:sldId id="416" r:id="rId24"/>
+    <p:sldId id="417" r:id="rId25"/>
+    <p:sldId id="418" r:id="rId26"/>
   </p:sldIdLst>
   <p:sldSz cx="24384000" cy="13716000"/>
   <p:notesSz cx="9144000" cy="6858000"/>
@@ -143,13 +150,20 @@
             <p14:sldId id="401"/>
             <p14:sldId id="402"/>
             <p14:sldId id="403"/>
-            <p14:sldId id="405"/>
+            <p14:sldId id="410"/>
+            <p14:sldId id="411"/>
             <p14:sldId id="404"/>
             <p14:sldId id="406"/>
             <p14:sldId id="407"/>
+            <p14:sldId id="412"/>
             <p14:sldId id="408"/>
             <p14:sldId id="409"/>
-            <p14:sldId id="321"/>
+            <p14:sldId id="415"/>
+            <p14:sldId id="414"/>
+            <p14:sldId id="413"/>
+            <p14:sldId id="416"/>
+            <p14:sldId id="417"/>
+            <p14:sldId id="418"/>
           </p14:sldIdLst>
         </p14:section>
       </p14:sectionLst>
@@ -313,7 +327,7 @@
           <a:p>
             <a:fld id="{04DCBC42-6563-49C0-9AB0-0B46679F5AB4}" type="datetimeFigureOut">
               <a:rPr lang="en-US" smtClean="0"/>
-              <a:t>2/18/2024</a:t>
+              <a:t>2/21/2024</a:t>
             </a:fld>
             <a:endParaRPr lang="en-US"/>
           </a:p>
@@ -11165,7 +11179,7 @@
         <p:cNvPr id="1" name="">
           <a:extLst>
             <a:ext uri="{FF2B5EF4-FFF2-40B4-BE49-F238E27FC236}">
-              <a16:creationId xmlns:a16="http://schemas.microsoft.com/office/drawing/2014/main" id="{6AFFA938-A2EC-F561-E51C-B5F03EEE7435}"/>
+              <a16:creationId xmlns:a16="http://schemas.microsoft.com/office/drawing/2014/main" id="{8D428294-3AA3-78D3-9CE2-0A01D5FB0156}"/>
             </a:ext>
           </a:extLst>
         </p:cNvPr>
@@ -11185,7 +11199,7 @@
           <p:cNvPr id="2" name="TextBox 1">
             <a:extLst>
               <a:ext uri="{FF2B5EF4-FFF2-40B4-BE49-F238E27FC236}">
-                <a16:creationId xmlns:a16="http://schemas.microsoft.com/office/drawing/2014/main" id="{9869461A-B48B-467B-D0A2-F4D115502135}"/>
+                <a16:creationId xmlns:a16="http://schemas.microsoft.com/office/drawing/2014/main" id="{D07EAB16-EC08-92EB-1E67-5129134FA379}"/>
               </a:ext>
             </a:extLst>
           </p:cNvPr>
@@ -11231,7 +11245,7 @@
           <p:cNvPr id="4" name="Straight Connector 3">
             <a:extLst>
               <a:ext uri="{FF2B5EF4-FFF2-40B4-BE49-F238E27FC236}">
-                <a16:creationId xmlns:a16="http://schemas.microsoft.com/office/drawing/2014/main" id="{74927773-5AC1-7169-0105-0E2EA8C84E07}"/>
+                <a16:creationId xmlns:a16="http://schemas.microsoft.com/office/drawing/2014/main" id="{179481E0-AC71-275D-89F0-224BF4CBB522}"/>
               </a:ext>
             </a:extLst>
           </p:cNvPr>
@@ -11272,7 +11286,7 @@
           <p:cNvPr id="5" name="TextBox 4">
             <a:extLst>
               <a:ext uri="{FF2B5EF4-FFF2-40B4-BE49-F238E27FC236}">
-                <a16:creationId xmlns:a16="http://schemas.microsoft.com/office/drawing/2014/main" id="{2368CFBC-9F3D-252C-2886-23A01A71E417}"/>
+                <a16:creationId xmlns:a16="http://schemas.microsoft.com/office/drawing/2014/main" id="{1606795F-4EF8-456C-03E1-4A0C18AD5D16}"/>
               </a:ext>
             </a:extLst>
           </p:cNvPr>
@@ -11282,7 +11296,7 @@
         <p:spPr>
           <a:xfrm>
             <a:off x="2827293" y="6610178"/>
-            <a:ext cx="19880307" cy="1969770"/>
+            <a:ext cx="19880307" cy="3908762"/>
           </a:xfrm>
           <a:prstGeom prst="rect">
             <a:avLst/>
@@ -11331,23 +11345,40 @@
               <a:t> ze zbiorem danych bez augmentacji.</a:t>
             </a:r>
           </a:p>
+          <a:p>
+            <a:pPr>
+              <a:spcAft>
+                <a:spcPts val="3600"/>
+              </a:spcAft>
+            </a:pPr>
+            <a:r>
+              <a:rPr lang="pl-PL" sz="3200" dirty="0">
+                <a:solidFill>
+                  <a:schemeClr val="bg1"/>
+                </a:solidFill>
+                <a:latin typeface="+mj-lt"/>
+                <a:cs typeface="Poppins" panose="02000000000000000000" pitchFamily="2" charset="0"/>
+              </a:rPr>
+              <a:t>Oprócz tego efekty uczenia sprawdzono na zbiorze testowym, w którym dodatkowo umieszczono zdjęcia wybrane przez prowadzącego. Wynik sprawdzenia przedstawiono w postaci macierzy pomyłek, która potwierdziła lepsze zachowanie się sieci bez augmentacji.</a:t>
+            </a:r>
+          </a:p>
         </p:txBody>
       </p:sp>
     </p:spTree>
     <p:extLst>
       <p:ext uri="{BB962C8B-B14F-4D97-AF65-F5344CB8AC3E}">
-        <p14:creationId xmlns:p14="http://schemas.microsoft.com/office/powerpoint/2010/main" val="404138352"/>
+        <p14:creationId xmlns:p14="http://schemas.microsoft.com/office/powerpoint/2010/main" val="992466566"/>
       </p:ext>
     </p:extLst>
   </p:cSld>
   <p:clrMapOvr>
     <a:masterClrMapping/>
   </p:clrMapOvr>
-  <mc:AlternateContent xmlns:mc="http://schemas.openxmlformats.org/markup-compatibility/2006" xmlns:p14="http://schemas.microsoft.com/office/powerpoint/2010/main">
-    <mc:Choice Requires="p14">
+  <mc:AlternateContent xmlns:mc="http://schemas.openxmlformats.org/markup-compatibility/2006">
+    <mc:Choice xmlns:p14="http://schemas.microsoft.com/office/powerpoint/2010/main" Requires="p14">
       <p:transition p14:dur="10"/>
     </mc:Choice>
-    <mc:Fallback xmlns="">
+    <mc:Fallback>
       <p:transition/>
     </mc:Fallback>
   </mc:AlternateContent>
@@ -11355,6 +11386,181 @@
 </file>
 
 <file path=ppt/slides/slide13.xml><?xml version="1.0" encoding="utf-8"?>
+<p:sld xmlns:a="http://schemas.openxmlformats.org/drawingml/2006/main" xmlns:r="http://schemas.openxmlformats.org/officeDocument/2006/relationships" xmlns:p="http://schemas.openxmlformats.org/presentationml/2006/main" showMasterSp="0">
+  <p:cSld>
+    <p:bg>
+      <p:bgPr>
+        <a:blipFill dpi="0" rotWithShape="1">
+          <a:blip r:embed="rId2">
+            <a:lum/>
+          </a:blip>
+          <a:srcRect/>
+          <a:stretch>
+            <a:fillRect/>
+          </a:stretch>
+        </a:blipFill>
+        <a:effectLst/>
+      </p:bgPr>
+    </p:bg>
+    <p:spTree>
+      <p:nvGrpSpPr>
+        <p:cNvPr id="1" name="">
+          <a:extLst>
+            <a:ext uri="{FF2B5EF4-FFF2-40B4-BE49-F238E27FC236}">
+              <a16:creationId xmlns:a16="http://schemas.microsoft.com/office/drawing/2014/main" id="{386364C1-3654-5F87-178A-B08036908CB7}"/>
+            </a:ext>
+          </a:extLst>
+        </p:cNvPr>
+        <p:cNvGrpSpPr/>
+        <p:nvPr/>
+      </p:nvGrpSpPr>
+      <p:grpSpPr>
+        <a:xfrm>
+          <a:off x="0" y="0"/>
+          <a:ext cx="0" cy="0"/>
+          <a:chOff x="0" y="0"/>
+          <a:chExt cx="0" cy="0"/>
+        </a:xfrm>
+      </p:grpSpPr>
+      <p:sp>
+        <p:nvSpPr>
+          <p:cNvPr id="2" name="TextBox 1">
+            <a:extLst>
+              <a:ext uri="{FF2B5EF4-FFF2-40B4-BE49-F238E27FC236}">
+                <a16:creationId xmlns:a16="http://schemas.microsoft.com/office/drawing/2014/main" id="{9AD8E129-4ED8-0EA5-9908-DB3D1F46FA0C}"/>
+              </a:ext>
+            </a:extLst>
+          </p:cNvPr>
+          <p:cNvSpPr txBox="1"/>
+          <p:nvPr/>
+        </p:nvSpPr>
+        <p:spPr>
+          <a:xfrm>
+            <a:off x="2827292" y="2561209"/>
+            <a:ext cx="15759646" cy="1107996"/>
+          </a:xfrm>
+          <a:prstGeom prst="rect">
+            <a:avLst/>
+          </a:prstGeom>
+          <a:noFill/>
+        </p:spPr>
+        <p:txBody>
+          <a:bodyPr wrap="square" lIns="0" tIns="0" rIns="0" bIns="0" rtlCol="0">
+            <a:spAutoFit/>
+          </a:bodyPr>
+          <a:lstStyle/>
+          <a:p>
+            <a:r>
+              <a:rPr lang="pl-PL" sz="7200" b="1" dirty="0">
+                <a:solidFill>
+                  <a:schemeClr val="bg1"/>
+                </a:solidFill>
+                <a:cs typeface="Poppins SemiBold" panose="02000000000000000000" pitchFamily="2" charset="0"/>
+              </a:rPr>
+              <a:t>Wnioski z augmentacji danych</a:t>
+            </a:r>
+            <a:endParaRPr lang="en-US" sz="7200" b="1" dirty="0">
+              <a:solidFill>
+                <a:schemeClr val="bg1"/>
+              </a:solidFill>
+              <a:cs typeface="Poppins SemiBold" panose="02000000000000000000" pitchFamily="2" charset="0"/>
+            </a:endParaRPr>
+          </a:p>
+        </p:txBody>
+      </p:sp>
+      <p:cxnSp>
+        <p:nvCxnSpPr>
+          <p:cNvPr id="4" name="Straight Connector 3">
+            <a:extLst>
+              <a:ext uri="{FF2B5EF4-FFF2-40B4-BE49-F238E27FC236}">
+                <a16:creationId xmlns:a16="http://schemas.microsoft.com/office/drawing/2014/main" id="{EB92AFE7-E287-080D-6A8E-593B6F0A81FD}"/>
+              </a:ext>
+            </a:extLst>
+          </p:cNvPr>
+          <p:cNvCxnSpPr/>
+          <p:nvPr/>
+        </p:nvCxnSpPr>
+        <p:spPr>
+          <a:xfrm flipH="1">
+            <a:off x="0" y="3135631"/>
+            <a:ext cx="1674813" cy="0"/>
+          </a:xfrm>
+          <a:prstGeom prst="line">
+            <a:avLst/>
+          </a:prstGeom>
+          <a:ln w="76200">
+            <a:solidFill>
+              <a:srgbClr val="FBBA00"/>
+            </a:solidFill>
+          </a:ln>
+        </p:spPr>
+        <p:style>
+          <a:lnRef idx="1">
+            <a:schemeClr val="accent1"/>
+          </a:lnRef>
+          <a:fillRef idx="0">
+            <a:schemeClr val="accent1"/>
+          </a:fillRef>
+          <a:effectRef idx="0">
+            <a:schemeClr val="accent1"/>
+          </a:effectRef>
+          <a:fontRef idx="minor">
+            <a:schemeClr val="tx1"/>
+          </a:fontRef>
+        </p:style>
+      </p:cxnSp>
+      <p:pic>
+        <p:nvPicPr>
+          <p:cNvPr id="8" name="Obraz 7">
+            <a:extLst>
+              <a:ext uri="{FF2B5EF4-FFF2-40B4-BE49-F238E27FC236}">
+                <a16:creationId xmlns:a16="http://schemas.microsoft.com/office/drawing/2014/main" id="{FE7671C0-8E96-A40B-AE89-241F47421D7A}"/>
+              </a:ext>
+            </a:extLst>
+          </p:cNvPr>
+          <p:cNvPicPr>
+            <a:picLocks noChangeAspect="1"/>
+          </p:cNvPicPr>
+          <p:nvPr/>
+        </p:nvPicPr>
+        <p:blipFill>
+          <a:blip r:embed="rId3"/>
+          <a:stretch>
+            <a:fillRect/>
+          </a:stretch>
+        </p:blipFill>
+        <p:spPr>
+          <a:xfrm>
+            <a:off x="2827292" y="3669205"/>
+            <a:ext cx="17973690" cy="8059377"/>
+          </a:xfrm>
+          <a:prstGeom prst="rect">
+            <a:avLst/>
+          </a:prstGeom>
+        </p:spPr>
+      </p:pic>
+    </p:spTree>
+    <p:extLst>
+      <p:ext uri="{BB962C8B-B14F-4D97-AF65-F5344CB8AC3E}">
+        <p14:creationId xmlns:p14="http://schemas.microsoft.com/office/powerpoint/2010/main" val="675870766"/>
+      </p:ext>
+    </p:extLst>
+  </p:cSld>
+  <p:clrMapOvr>
+    <a:masterClrMapping/>
+  </p:clrMapOvr>
+  <mc:AlternateContent xmlns:mc="http://schemas.openxmlformats.org/markup-compatibility/2006">
+    <mc:Choice xmlns:p14="http://schemas.microsoft.com/office/powerpoint/2010/main" Requires="p14">
+      <p:transition p14:dur="10"/>
+    </mc:Choice>
+    <mc:Fallback>
+      <p:transition/>
+    </mc:Fallback>
+  </mc:AlternateContent>
+</p:sld>
+</file>
+
+<file path=ppt/slides/slide14.xml><?xml version="1.0" encoding="utf-8"?>
 <p:sld xmlns:a="http://schemas.openxmlformats.org/drawingml/2006/main" xmlns:r="http://schemas.openxmlformats.org/officeDocument/2006/relationships" xmlns:p="http://schemas.openxmlformats.org/presentationml/2006/main" showMasterSp="0">
   <p:cSld>
     <p:bg>
@@ -11493,7 +11699,7 @@
         <p:spPr>
           <a:xfrm>
             <a:off x="2827293" y="6610178"/>
-            <a:ext cx="19880307" cy="3908762"/>
+            <a:ext cx="19880307" cy="4893647"/>
           </a:xfrm>
           <a:prstGeom prst="rect">
             <a:avLst/>
@@ -11519,27 +11725,7 @@
                 <a:latin typeface="+mj-lt"/>
                 <a:cs typeface="Poppins" panose="02000000000000000000" pitchFamily="2" charset="0"/>
               </a:rPr>
-              <a:t>W celu przygotowania sieci neuronowej zdolnej do detekcji znaków konieczne było wykorzystanie wcześniej zaprojektowanej sieci. Wybór padł na sieć Resnet50 ze zmodyfikowanymi warstwami. </a:t>
-            </a:r>
-            <a:r>
-              <a:rPr lang="pl-PL" sz="3200" dirty="0" err="1">
-                <a:solidFill>
-                  <a:schemeClr val="bg1"/>
-                </a:solidFill>
-                <a:latin typeface="+mj-lt"/>
-                <a:cs typeface="Poppins" panose="02000000000000000000" pitchFamily="2" charset="0"/>
-              </a:rPr>
-              <a:t>Pretrenowaną</a:t>
-            </a:r>
-            <a:r>
-              <a:rPr lang="pl-PL" sz="3200" dirty="0">
-                <a:solidFill>
-                  <a:schemeClr val="bg1"/>
-                </a:solidFill>
-                <a:latin typeface="+mj-lt"/>
-                <a:cs typeface="Poppins" panose="02000000000000000000" pitchFamily="2" charset="0"/>
-              </a:rPr>
-              <a:t> sieć użyto w detektorze YOLO4 (</a:t>
+              <a:t>W celu przygotowania sieci neuronowej zdolnej do detekcji znaków konieczne było wykorzystanie głębokiej sieci neuronowej oraz odpowiedniego detektora. Wybór padł na detektory YOLOv2 oraz YOLOv4 (</a:t>
             </a:r>
             <a:r>
               <a:rPr lang="pl-PL" sz="3200" dirty="0" err="1">
@@ -11619,7 +11805,27 @@
                 <a:latin typeface="+mj-lt"/>
                 <a:cs typeface="Poppins" panose="02000000000000000000" pitchFamily="2" charset="0"/>
               </a:rPr>
-              <a:t>).</a:t>
+              <a:t>). Aby detektor mógł zadziałać, potrzebował </a:t>
+            </a:r>
+            <a:r>
+              <a:rPr lang="pl-PL" sz="3200" dirty="0" err="1">
+                <a:solidFill>
+                  <a:schemeClr val="bg1"/>
+                </a:solidFill>
+                <a:latin typeface="+mj-lt"/>
+                <a:cs typeface="Poppins" panose="02000000000000000000" pitchFamily="2" charset="0"/>
+              </a:rPr>
+              <a:t>pretrenowanej</a:t>
+            </a:r>
+            <a:r>
+              <a:rPr lang="pl-PL" sz="3200" dirty="0">
+                <a:solidFill>
+                  <a:schemeClr val="bg1"/>
+                </a:solidFill>
+                <a:latin typeface="+mj-lt"/>
+                <a:cs typeface="Poppins" panose="02000000000000000000" pitchFamily="2" charset="0"/>
+              </a:rPr>
+              <a:t> sieci. Po testach wydajności wielu sieci podjęto decyzję o użyciu sieci ResNet50.</a:t>
             </a:r>
           </a:p>
           <a:p>
@@ -11636,7 +11842,7 @@
                 <a:latin typeface="+mj-lt"/>
                 <a:cs typeface="Poppins" panose="02000000000000000000" pitchFamily="2" charset="0"/>
               </a:rPr>
-              <a:t>W przypadku detekcji znaków skorzystano z innego zbioru testowego niż przy rozpoznawaniu znaków. Zbiór obejmował zrzuty ekranu z Google </a:t>
+              <a:t>W przypadku detekcji znaków skorzystano z innego zbioru danych niż przy rozpoznawaniu znaków. Zbiór obejmował zrzuty ekranu z Google </a:t>
             </a:r>
             <a:r>
               <a:rPr lang="pl-PL" sz="3200" dirty="0" err="1">
@@ -11696,7 +11902,7 @@
                 <a:latin typeface="+mj-lt"/>
                 <a:cs typeface="Poppins" panose="02000000000000000000" pitchFamily="2" charset="0"/>
               </a:rPr>
-              <a:t>, na których widoczne były różne obiekty. Następnie ręcznie zaznaczono obszary, w których znajdowały się znaki. Cały zbiór (zdjęcia oraz ramki ograniczające znaki) podzielono na dane treningowe oraz walidacyjne. Zdjęcia pomniejszono do rozmiaru odpowiedniego dla sieci </a:t>
+              <a:t>, na których widoczne były różne obiekty. Liczebność zbioru wynosiła 90 zdjęć. Następnie ręcznie zaznaczono obszary, w których znajdowały się znaki. Cały zbiór (zdjęcia oraz ramki ograniczające znaki) podzielono na dane treningowe, walidacyjne i testowe, a dane testowe i walidacyjne dodatkowo poddano augmentacji. Zdjęcia pomniejszono do rozmiaru odpowiedniego dla sieci </a:t>
             </a:r>
             <a:r>
               <a:rPr lang="pl-PL" sz="3200" dirty="0" err="1">
@@ -11725,197 +11931,6 @@
     <p:extLst>
       <p:ext uri="{BB962C8B-B14F-4D97-AF65-F5344CB8AC3E}">
         <p14:creationId xmlns:p14="http://schemas.microsoft.com/office/powerpoint/2010/main" val="3192190180"/>
-      </p:ext>
-    </p:extLst>
-  </p:cSld>
-  <p:clrMapOvr>
-    <a:masterClrMapping/>
-  </p:clrMapOvr>
-  <mc:AlternateContent xmlns:mc="http://schemas.openxmlformats.org/markup-compatibility/2006" xmlns:p14="http://schemas.microsoft.com/office/powerpoint/2010/main">
-    <mc:Choice Requires="p14">
-      <p:transition p14:dur="10"/>
-    </mc:Choice>
-    <mc:Fallback xmlns="">
-      <p:transition/>
-    </mc:Fallback>
-  </mc:AlternateContent>
-</p:sld>
-</file>
-
-<file path=ppt/slides/slide14.xml><?xml version="1.0" encoding="utf-8"?>
-<p:sld xmlns:a="http://schemas.openxmlformats.org/drawingml/2006/main" xmlns:r="http://schemas.openxmlformats.org/officeDocument/2006/relationships" xmlns:p="http://schemas.openxmlformats.org/presentationml/2006/main" showMasterSp="0">
-  <p:cSld>
-    <p:bg>
-      <p:bgPr>
-        <a:blipFill dpi="0" rotWithShape="1">
-          <a:blip r:embed="rId2">
-            <a:lum/>
-          </a:blip>
-          <a:srcRect/>
-          <a:stretch>
-            <a:fillRect/>
-          </a:stretch>
-        </a:blipFill>
-        <a:effectLst/>
-      </p:bgPr>
-    </p:bg>
-    <p:spTree>
-      <p:nvGrpSpPr>
-        <p:cNvPr id="1" name="">
-          <a:extLst>
-            <a:ext uri="{FF2B5EF4-FFF2-40B4-BE49-F238E27FC236}">
-              <a16:creationId xmlns:a16="http://schemas.microsoft.com/office/drawing/2014/main" id="{5D12A906-3039-3E63-824E-AAF47AA05CE4}"/>
-            </a:ext>
-          </a:extLst>
-        </p:cNvPr>
-        <p:cNvGrpSpPr/>
-        <p:nvPr/>
-      </p:nvGrpSpPr>
-      <p:grpSpPr>
-        <a:xfrm>
-          <a:off x="0" y="0"/>
-          <a:ext cx="0" cy="0"/>
-          <a:chOff x="0" y="0"/>
-          <a:chExt cx="0" cy="0"/>
-        </a:xfrm>
-      </p:grpSpPr>
-      <p:sp>
-        <p:nvSpPr>
-          <p:cNvPr id="2" name="TextBox 1">
-            <a:extLst>
-              <a:ext uri="{FF2B5EF4-FFF2-40B4-BE49-F238E27FC236}">
-                <a16:creationId xmlns:a16="http://schemas.microsoft.com/office/drawing/2014/main" id="{551F97F0-C987-6691-2152-4F6BC8045DF6}"/>
-              </a:ext>
-            </a:extLst>
-          </p:cNvPr>
-          <p:cNvSpPr txBox="1"/>
-          <p:nvPr/>
-        </p:nvSpPr>
-        <p:spPr>
-          <a:xfrm>
-            <a:off x="2827292" y="2561209"/>
-            <a:ext cx="15759646" cy="1107996"/>
-          </a:xfrm>
-          <a:prstGeom prst="rect">
-            <a:avLst/>
-          </a:prstGeom>
-          <a:noFill/>
-        </p:spPr>
-        <p:txBody>
-          <a:bodyPr wrap="square" lIns="0" tIns="0" rIns="0" bIns="0" rtlCol="0">
-            <a:spAutoFit/>
-          </a:bodyPr>
-          <a:lstStyle/>
-          <a:p>
-            <a:r>
-              <a:rPr lang="pl-PL" sz="7200" b="1" dirty="0">
-                <a:solidFill>
-                  <a:schemeClr val="bg1"/>
-                </a:solidFill>
-                <a:cs typeface="Poppins SemiBold" panose="02000000000000000000" pitchFamily="2" charset="0"/>
-              </a:rPr>
-              <a:t>Kolejne kroki</a:t>
-            </a:r>
-            <a:endParaRPr lang="en-US" sz="7200" b="1" dirty="0">
-              <a:solidFill>
-                <a:schemeClr val="bg1"/>
-              </a:solidFill>
-              <a:cs typeface="Poppins SemiBold" panose="02000000000000000000" pitchFamily="2" charset="0"/>
-            </a:endParaRPr>
-          </a:p>
-        </p:txBody>
-      </p:sp>
-      <p:cxnSp>
-        <p:nvCxnSpPr>
-          <p:cNvPr id="4" name="Straight Connector 3">
-            <a:extLst>
-              <a:ext uri="{FF2B5EF4-FFF2-40B4-BE49-F238E27FC236}">
-                <a16:creationId xmlns:a16="http://schemas.microsoft.com/office/drawing/2014/main" id="{EAF70462-272D-9347-A62A-2FB217669ED7}"/>
-              </a:ext>
-            </a:extLst>
-          </p:cNvPr>
-          <p:cNvCxnSpPr/>
-          <p:nvPr/>
-        </p:nvCxnSpPr>
-        <p:spPr>
-          <a:xfrm flipH="1">
-            <a:off x="0" y="3135631"/>
-            <a:ext cx="1674813" cy="0"/>
-          </a:xfrm>
-          <a:prstGeom prst="line">
-            <a:avLst/>
-          </a:prstGeom>
-          <a:ln w="76200">
-            <a:solidFill>
-              <a:srgbClr val="FBBA00"/>
-            </a:solidFill>
-          </a:ln>
-        </p:spPr>
-        <p:style>
-          <a:lnRef idx="1">
-            <a:schemeClr val="accent1"/>
-          </a:lnRef>
-          <a:fillRef idx="0">
-            <a:schemeClr val="accent1"/>
-          </a:fillRef>
-          <a:effectRef idx="0">
-            <a:schemeClr val="accent1"/>
-          </a:effectRef>
-          <a:fontRef idx="minor">
-            <a:schemeClr val="tx1"/>
-          </a:fontRef>
-        </p:style>
-      </p:cxnSp>
-      <p:sp>
-        <p:nvSpPr>
-          <p:cNvPr id="5" name="TextBox 4">
-            <a:extLst>
-              <a:ext uri="{FF2B5EF4-FFF2-40B4-BE49-F238E27FC236}">
-                <a16:creationId xmlns:a16="http://schemas.microsoft.com/office/drawing/2014/main" id="{834AE85C-4B6F-3DCA-DA69-45D221AD32A6}"/>
-              </a:ext>
-            </a:extLst>
-          </p:cNvPr>
-          <p:cNvSpPr txBox="1"/>
-          <p:nvPr/>
-        </p:nvSpPr>
-        <p:spPr>
-          <a:xfrm>
-            <a:off x="2827293" y="6610178"/>
-            <a:ext cx="19880307" cy="492443"/>
-          </a:xfrm>
-          <a:prstGeom prst="rect">
-            <a:avLst/>
-          </a:prstGeom>
-          <a:noFill/>
-        </p:spPr>
-        <p:txBody>
-          <a:bodyPr wrap="square" lIns="0" tIns="0" rIns="0" bIns="0" rtlCol="0">
-            <a:spAutoFit/>
-          </a:bodyPr>
-          <a:lstStyle/>
-          <a:p>
-            <a:pPr>
-              <a:spcAft>
-                <a:spcPts val="3600"/>
-              </a:spcAft>
-            </a:pPr>
-            <a:r>
-              <a:rPr lang="pl-PL" sz="3200" dirty="0">
-                <a:solidFill>
-                  <a:schemeClr val="bg1"/>
-                </a:solidFill>
-                <a:latin typeface="+mj-lt"/>
-                <a:cs typeface="Poppins" panose="02000000000000000000" pitchFamily="2" charset="0"/>
-              </a:rPr>
-              <a:t>…</a:t>
-            </a:r>
-          </a:p>
-        </p:txBody>
-      </p:sp>
-    </p:spTree>
-    <p:extLst>
-      <p:ext uri="{BB962C8B-B14F-4D97-AF65-F5344CB8AC3E}">
-        <p14:creationId xmlns:p14="http://schemas.microsoft.com/office/powerpoint/2010/main" val="3771517126"/>
       </p:ext>
     </p:extLst>
   </p:cSld>
@@ -11955,7 +11970,7 @@
         <p:cNvPr id="1" name="">
           <a:extLst>
             <a:ext uri="{FF2B5EF4-FFF2-40B4-BE49-F238E27FC236}">
-              <a16:creationId xmlns:a16="http://schemas.microsoft.com/office/drawing/2014/main" id="{C413BE0E-7EAE-363B-9E89-19A623C43998}"/>
+              <a16:creationId xmlns:a16="http://schemas.microsoft.com/office/drawing/2014/main" id="{5D12A906-3039-3E63-824E-AAF47AA05CE4}"/>
             </a:ext>
           </a:extLst>
         </p:cNvPr>
@@ -11975,7 +11990,7 @@
           <p:cNvPr id="2" name="TextBox 1">
             <a:extLst>
               <a:ext uri="{FF2B5EF4-FFF2-40B4-BE49-F238E27FC236}">
-                <a16:creationId xmlns:a16="http://schemas.microsoft.com/office/drawing/2014/main" id="{6BDCF05A-75EF-754A-8DDC-E3B31FC6A3CA}"/>
+                <a16:creationId xmlns:a16="http://schemas.microsoft.com/office/drawing/2014/main" id="{551F97F0-C987-6691-2152-4F6BC8045DF6}"/>
               </a:ext>
             </a:extLst>
           </p:cNvPr>
@@ -12005,7 +12020,7 @@
                 </a:solidFill>
                 <a:cs typeface="Poppins SemiBold" panose="02000000000000000000" pitchFamily="2" charset="0"/>
               </a:rPr>
-              <a:t>Kolejne kroki</a:t>
+              <a:t>Augmentacja danych modelu YOLO</a:t>
             </a:r>
             <a:endParaRPr lang="en-US" sz="7200" b="1" dirty="0">
               <a:solidFill>
@@ -12021,7 +12036,7 @@
           <p:cNvPr id="4" name="Straight Connector 3">
             <a:extLst>
               <a:ext uri="{FF2B5EF4-FFF2-40B4-BE49-F238E27FC236}">
-                <a16:creationId xmlns:a16="http://schemas.microsoft.com/office/drawing/2014/main" id="{735AED94-874F-20BD-744D-DF5F1092CE3E}"/>
+                <a16:creationId xmlns:a16="http://schemas.microsoft.com/office/drawing/2014/main" id="{EAF70462-272D-9347-A62A-2FB217669ED7}"/>
               </a:ext>
             </a:extLst>
           </p:cNvPr>
@@ -12062,7 +12077,7 @@
           <p:cNvPr id="5" name="TextBox 4">
             <a:extLst>
               <a:ext uri="{FF2B5EF4-FFF2-40B4-BE49-F238E27FC236}">
-                <a16:creationId xmlns:a16="http://schemas.microsoft.com/office/drawing/2014/main" id="{5463FCC1-8A58-253D-2ACC-76067E95B525}"/>
+                <a16:creationId xmlns:a16="http://schemas.microsoft.com/office/drawing/2014/main" id="{834AE85C-4B6F-3DCA-DA69-45D221AD32A6}"/>
               </a:ext>
             </a:extLst>
           </p:cNvPr>
@@ -12072,7 +12087,7 @@
         <p:spPr>
           <a:xfrm>
             <a:off x="2827293" y="6610178"/>
-            <a:ext cx="19880307" cy="492443"/>
+            <a:ext cx="19880307" cy="3416320"/>
           </a:xfrm>
           <a:prstGeom prst="rect">
             <a:avLst/>
@@ -12098,7 +12113,44 @@
                 <a:latin typeface="+mj-lt"/>
                 <a:cs typeface="Poppins" panose="02000000000000000000" pitchFamily="2" charset="0"/>
               </a:rPr>
-              <a:t>…</a:t>
+              <a:t>W przeciwieństwie do zbioru z modelu dwunastowarstwowego, zbiór dla modelu YOLO składał się nawet w 95% z</a:t>
+            </a:r>
+            <a:r>
+              <a:rPr lang="pl-PL" sz="3200" dirty="0">
+                <a:solidFill>
+                  <a:schemeClr val="bg1"/>
+                </a:solidFill>
+                <a:latin typeface="Calibri" panose="020F0502020204030204" pitchFamily="34" charset="0"/>
+                <a:cs typeface="Calibri" panose="020F0502020204030204" pitchFamily="34" charset="0"/>
+              </a:rPr>
+              <a:t> </a:t>
+            </a:r>
+            <a:r>
+              <a:rPr lang="pl-PL" sz="3200" dirty="0">
+                <a:solidFill>
+                  <a:schemeClr val="bg1"/>
+                </a:solidFill>
+                <a:latin typeface="+mj-lt"/>
+                <a:cs typeface="Poppins" panose="02000000000000000000" pitchFamily="2" charset="0"/>
+              </a:rPr>
+              <a:t>obiektów niebędących znakami. Rodzaj, kolor czy kontrast tych obiektów może wpływać na cechy preferowane przez sieć, chociaż to nie te elementy są podstawą detekcji znaków. </a:t>
+            </a:r>
+          </a:p>
+          <a:p>
+            <a:pPr>
+              <a:spcAft>
+                <a:spcPts val="3600"/>
+              </a:spcAft>
+            </a:pPr>
+            <a:r>
+              <a:rPr lang="pl-PL" sz="3200" dirty="0">
+                <a:solidFill>
+                  <a:schemeClr val="bg1"/>
+                </a:solidFill>
+                <a:latin typeface="+mj-lt"/>
+                <a:cs typeface="Poppins" panose="02000000000000000000" pitchFamily="2" charset="0"/>
+              </a:rPr>
+              <a:t>Dlatego też skorzystano z augmentacji danych, która nie powodowała pochylenia czy przesunięcia obiektów poza obraz. Modyfikacji uległa ich reprezentacja barwna – kontrast, nasycenie kolorów czy dodanie szumu. W niewielkim stopniu dodano także obrót, ponieważ nawet oryginalne zdjęcia posiadały znaki obrócone względem obserwatora.</a:t>
             </a:r>
           </a:p>
         </p:txBody>
@@ -12106,7 +12158,7 @@
     </p:spTree>
     <p:extLst>
       <p:ext uri="{BB962C8B-B14F-4D97-AF65-F5344CB8AC3E}">
-        <p14:creationId xmlns:p14="http://schemas.microsoft.com/office/powerpoint/2010/main" val="1438660421"/>
+        <p14:creationId xmlns:p14="http://schemas.microsoft.com/office/powerpoint/2010/main" val="3771517126"/>
       </p:ext>
     </p:extLst>
   </p:cSld>
@@ -12146,7 +12198,7 @@
         <p:cNvPr id="1" name="">
           <a:extLst>
             <a:ext uri="{FF2B5EF4-FFF2-40B4-BE49-F238E27FC236}">
-              <a16:creationId xmlns:a16="http://schemas.microsoft.com/office/drawing/2014/main" id="{A9AC6C1A-B5A2-F114-3CA9-83FFFFAFD3E8}"/>
+              <a16:creationId xmlns:a16="http://schemas.microsoft.com/office/drawing/2014/main" id="{C413BE0E-7EAE-363B-9E89-19A623C43998}"/>
             </a:ext>
           </a:extLst>
         </p:cNvPr>
@@ -12166,7 +12218,7 @@
           <p:cNvPr id="2" name="TextBox 1">
             <a:extLst>
               <a:ext uri="{FF2B5EF4-FFF2-40B4-BE49-F238E27FC236}">
-                <a16:creationId xmlns:a16="http://schemas.microsoft.com/office/drawing/2014/main" id="{954E090B-1DEB-2476-B600-E68BDD77F96E}"/>
+                <a16:creationId xmlns:a16="http://schemas.microsoft.com/office/drawing/2014/main" id="{6BDCF05A-75EF-754A-8DDC-E3B31FC6A3CA}"/>
               </a:ext>
             </a:extLst>
           </p:cNvPr>
@@ -12196,7 +12248,7 @@
                 </a:solidFill>
                 <a:cs typeface="Poppins SemiBold" panose="02000000000000000000" pitchFamily="2" charset="0"/>
               </a:rPr>
-              <a:t>Kolejne kroki</a:t>
+              <a:t>Struktura sieci ResNet50</a:t>
             </a:r>
             <a:endParaRPr lang="en-US" sz="7200" b="1" dirty="0">
               <a:solidFill>
@@ -12212,7 +12264,7 @@
           <p:cNvPr id="4" name="Straight Connector 3">
             <a:extLst>
               <a:ext uri="{FF2B5EF4-FFF2-40B4-BE49-F238E27FC236}">
-                <a16:creationId xmlns:a16="http://schemas.microsoft.com/office/drawing/2014/main" id="{8C510167-3CAB-D880-3DF2-AD041BA79914}"/>
+                <a16:creationId xmlns:a16="http://schemas.microsoft.com/office/drawing/2014/main" id="{735AED94-874F-20BD-744D-DF5F1092CE3E}"/>
               </a:ext>
             </a:extLst>
           </p:cNvPr>
@@ -12253,7 +12305,7 @@
           <p:cNvPr id="5" name="TextBox 4">
             <a:extLst>
               <a:ext uri="{FF2B5EF4-FFF2-40B4-BE49-F238E27FC236}">
-                <a16:creationId xmlns:a16="http://schemas.microsoft.com/office/drawing/2014/main" id="{C970ED69-6BD8-DCF9-AD0D-929B57BF8234}"/>
+                <a16:creationId xmlns:a16="http://schemas.microsoft.com/office/drawing/2014/main" id="{5463FCC1-8A58-253D-2ACC-76067E95B525}"/>
               </a:ext>
             </a:extLst>
           </p:cNvPr>
@@ -12263,7 +12315,7 @@
         <p:spPr>
           <a:xfrm>
             <a:off x="2827293" y="6610178"/>
-            <a:ext cx="19880307" cy="492443"/>
+            <a:ext cx="19880307" cy="3908762"/>
           </a:xfrm>
           <a:prstGeom prst="rect">
             <a:avLst/>
@@ -12289,7 +12341,104 @@
                 <a:latin typeface="+mj-lt"/>
                 <a:cs typeface="Poppins" panose="02000000000000000000" pitchFamily="2" charset="0"/>
               </a:rPr>
-              <a:t>…</a:t>
+              <a:t>Sieć ResNet50, jak wskazuje nazwa, posiada 50 warstw. Jest to sieć stworzona głównie do pracy z obrazami. Ponieważ w</a:t>
+            </a:r>
+            <a:r>
+              <a:rPr lang="pl-PL" sz="3200" dirty="0">
+                <a:solidFill>
+                  <a:schemeClr val="bg1"/>
+                </a:solidFill>
+                <a:latin typeface="Calibri" panose="020F0502020204030204" pitchFamily="34" charset="0"/>
+                <a:cs typeface="Calibri" panose="020F0502020204030204" pitchFamily="34" charset="0"/>
+              </a:rPr>
+              <a:t> </a:t>
+            </a:r>
+            <a:r>
+              <a:rPr lang="pl-PL" sz="3200" dirty="0">
+                <a:solidFill>
+                  <a:schemeClr val="bg1"/>
+                </a:solidFill>
+                <a:latin typeface="+mj-lt"/>
+                <a:cs typeface="Poppins" panose="02000000000000000000" pitchFamily="2" charset="0"/>
+              </a:rPr>
+              <a:t>projekcie wykorzystywano sieć </a:t>
+            </a:r>
+            <a:r>
+              <a:rPr lang="pl-PL" sz="3200" dirty="0" err="1">
+                <a:solidFill>
+                  <a:schemeClr val="bg1"/>
+                </a:solidFill>
+                <a:latin typeface="+mj-lt"/>
+                <a:cs typeface="Poppins" panose="02000000000000000000" pitchFamily="2" charset="0"/>
+              </a:rPr>
+              <a:t>pretrenowaną</a:t>
+            </a:r>
+            <a:r>
+              <a:rPr lang="pl-PL" sz="3200" dirty="0">
+                <a:solidFill>
+                  <a:schemeClr val="bg1"/>
+                </a:solidFill>
+                <a:latin typeface="+mj-lt"/>
+                <a:cs typeface="Poppins" panose="02000000000000000000" pitchFamily="2" charset="0"/>
+              </a:rPr>
+              <a:t>, zmiany dokonywane były w obrębie warstw początkowych oraz końcowych.</a:t>
+            </a:r>
+          </a:p>
+          <a:p>
+            <a:pPr>
+              <a:spcAft>
+                <a:spcPts val="3600"/>
+              </a:spcAft>
+            </a:pPr>
+            <a:r>
+              <a:rPr lang="pl-PL" sz="3200" dirty="0">
+                <a:solidFill>
+                  <a:schemeClr val="bg1"/>
+                </a:solidFill>
+                <a:latin typeface="+mj-lt"/>
+                <a:cs typeface="Poppins" panose="02000000000000000000" pitchFamily="2" charset="0"/>
+              </a:rPr>
+              <a:t>Zmiany dla warstw początkowych dotyczyły głównie rozmiaru obrazu wejściowego, co wpływa na rozmiar danych w</a:t>
+            </a:r>
+            <a:r>
+              <a:rPr lang="pl-PL" sz="3200" dirty="0">
+                <a:solidFill>
+                  <a:schemeClr val="bg1"/>
+                </a:solidFill>
+                <a:latin typeface="Calibri" panose="020F0502020204030204" pitchFamily="34" charset="0"/>
+                <a:cs typeface="Calibri" panose="020F0502020204030204" pitchFamily="34" charset="0"/>
+              </a:rPr>
+              <a:t> </a:t>
+            </a:r>
+            <a:r>
+              <a:rPr lang="pl-PL" sz="3200" dirty="0">
+                <a:solidFill>
+                  <a:schemeClr val="bg1"/>
+                </a:solidFill>
+                <a:latin typeface="+mj-lt"/>
+                <a:cs typeface="Poppins" panose="02000000000000000000" pitchFamily="2" charset="0"/>
+              </a:rPr>
+              <a:t>kolejnych warstwach sieci. Najistotniejsze z punktu widzenia uczenia zmiany dokonywane były dla końcowych warstw sieci. Najważniejsze zmiany dotyczyły warstw pochodzących bezpośrednio z detektora, a które nie są typowe dla sieci </a:t>
+            </a:r>
+            <a:r>
+              <a:rPr lang="pl-PL" sz="3200" dirty="0" err="1">
+                <a:solidFill>
+                  <a:schemeClr val="bg1"/>
+                </a:solidFill>
+                <a:latin typeface="+mj-lt"/>
+                <a:cs typeface="Poppins" panose="02000000000000000000" pitchFamily="2" charset="0"/>
+              </a:rPr>
+              <a:t>ResNet</a:t>
+            </a:r>
+            <a:r>
+              <a:rPr lang="pl-PL" sz="3200" dirty="0">
+                <a:solidFill>
+                  <a:schemeClr val="bg1"/>
+                </a:solidFill>
+                <a:latin typeface="+mj-lt"/>
+                <a:cs typeface="Poppins" panose="02000000000000000000" pitchFamily="2" charset="0"/>
+              </a:rPr>
+              <a:t> samej w sobie.</a:t>
             </a:r>
           </a:p>
         </p:txBody>
@@ -12297,7 +12446,7 @@
     </p:spTree>
     <p:extLst>
       <p:ext uri="{BB962C8B-B14F-4D97-AF65-F5344CB8AC3E}">
-        <p14:creationId xmlns:p14="http://schemas.microsoft.com/office/powerpoint/2010/main" val="2479049908"/>
+        <p14:creationId xmlns:p14="http://schemas.microsoft.com/office/powerpoint/2010/main" val="1438660421"/>
       </p:ext>
     </p:extLst>
   </p:cSld>
@@ -12337,7 +12486,7 @@
         <p:cNvPr id="1" name="">
           <a:extLst>
             <a:ext uri="{FF2B5EF4-FFF2-40B4-BE49-F238E27FC236}">
-              <a16:creationId xmlns:a16="http://schemas.microsoft.com/office/drawing/2014/main" id="{EA9EAAF1-5646-F4DA-762C-887939BA151C}"/>
+              <a16:creationId xmlns:a16="http://schemas.microsoft.com/office/drawing/2014/main" id="{6DB987D7-8664-7C01-A117-6F8E2D7D6275}"/>
             </a:ext>
           </a:extLst>
         </p:cNvPr>
@@ -12357,7 +12506,7 @@
           <p:cNvPr id="2" name="TextBox 1">
             <a:extLst>
               <a:ext uri="{FF2B5EF4-FFF2-40B4-BE49-F238E27FC236}">
-                <a16:creationId xmlns:a16="http://schemas.microsoft.com/office/drawing/2014/main" id="{54F70D17-9444-0B3E-B207-0E99C762B6A1}"/>
+                <a16:creationId xmlns:a16="http://schemas.microsoft.com/office/drawing/2014/main" id="{173F3BDF-5F6C-1ACD-DC31-78EA74BFE69D}"/>
               </a:ext>
             </a:extLst>
           </p:cNvPr>
@@ -12366,7 +12515,7 @@
         </p:nvSpPr>
         <p:spPr>
           <a:xfrm>
-            <a:off x="2827292" y="2561209"/>
+            <a:off x="2827292" y="433457"/>
             <a:ext cx="15759646" cy="1107996"/>
           </a:xfrm>
           <a:prstGeom prst="rect">
@@ -12387,7 +12536,7 @@
                 </a:solidFill>
                 <a:cs typeface="Poppins SemiBold" panose="02000000000000000000" pitchFamily="2" charset="0"/>
               </a:rPr>
-              <a:t>Kolejne kroki</a:t>
+              <a:t>Struktura sieci ResNet50</a:t>
             </a:r>
             <a:endParaRPr lang="en-US" sz="7200" b="1" dirty="0">
               <a:solidFill>
@@ -12403,7 +12552,7 @@
           <p:cNvPr id="4" name="Straight Connector 3">
             <a:extLst>
               <a:ext uri="{FF2B5EF4-FFF2-40B4-BE49-F238E27FC236}">
-                <a16:creationId xmlns:a16="http://schemas.microsoft.com/office/drawing/2014/main" id="{653C8521-FA33-3D5B-5727-653DFA875570}"/>
+                <a16:creationId xmlns:a16="http://schemas.microsoft.com/office/drawing/2014/main" id="{7A80E844-15D1-A8C6-DF72-BFCE82DB357E}"/>
               </a:ext>
             </a:extLst>
           </p:cNvPr>
@@ -12412,7 +12561,7 @@
         </p:nvCxnSpPr>
         <p:spPr>
           <a:xfrm flipH="1">
-            <a:off x="0" y="3135631"/>
+            <a:off x="0" y="1007879"/>
             <a:ext cx="1674813" cy="0"/>
           </a:xfrm>
           <a:prstGeom prst="line">
@@ -12439,67 +12588,93 @@
           </a:fontRef>
         </p:style>
       </p:cxnSp>
-      <p:sp>
-        <p:nvSpPr>
-          <p:cNvPr id="5" name="TextBox 4">
+      <p:pic>
+        <p:nvPicPr>
+          <p:cNvPr id="3" name="Obraz 2" descr="Obraz zawierający tekst, diagram, linia, zrzut ekranu&#10;&#10;Opis wygenerowany automatycznie">
             <a:extLst>
               <a:ext uri="{FF2B5EF4-FFF2-40B4-BE49-F238E27FC236}">
-                <a16:creationId xmlns:a16="http://schemas.microsoft.com/office/drawing/2014/main" id="{F12F3FF0-75CA-C9CF-DDFC-FC2324EEBF17}"/>
+                <a16:creationId xmlns:a16="http://schemas.microsoft.com/office/drawing/2014/main" id="{CEA06AAA-1C20-91B8-9E30-07133A1A9558}"/>
               </a:ext>
             </a:extLst>
           </p:cNvPr>
-          <p:cNvSpPr txBox="1"/>
+          <p:cNvPicPr>
+            <a:picLocks noChangeAspect="1"/>
+          </p:cNvPicPr>
           <p:nvPr/>
-        </p:nvSpPr>
-        <p:spPr>
-          <a:xfrm>
-            <a:off x="2827293" y="6610178"/>
-            <a:ext cx="19880307" cy="492443"/>
-          </a:xfrm>
-          <a:prstGeom prst="rect">
-            <a:avLst/>
-          </a:prstGeom>
-          <a:noFill/>
-        </p:spPr>
-        <p:txBody>
-          <a:bodyPr wrap="square" lIns="0" tIns="0" rIns="0" bIns="0" rtlCol="0">
-            <a:spAutoFit/>
-          </a:bodyPr>
-          <a:lstStyle/>
-          <a:p>
-            <a:pPr>
-              <a:spcAft>
-                <a:spcPts val="3600"/>
-              </a:spcAft>
-            </a:pPr>
-            <a:r>
-              <a:rPr lang="pl-PL" sz="3200" dirty="0">
-                <a:solidFill>
-                  <a:schemeClr val="bg1"/>
-                </a:solidFill>
-                <a:latin typeface="+mj-lt"/>
-                <a:cs typeface="Poppins" panose="02000000000000000000" pitchFamily="2" charset="0"/>
-              </a:rPr>
-              <a:t>…</a:t>
-            </a:r>
-          </a:p>
-        </p:txBody>
-      </p:sp>
+        </p:nvPicPr>
+        <p:blipFill>
+          <a:blip r:embed="rId3">
+            <a:extLst>
+              <a:ext uri="{28A0092B-C50C-407E-A947-70E740481C1C}">
+                <a14:useLocalDpi xmlns:a14="http://schemas.microsoft.com/office/drawing/2010/main" val="0"/>
+              </a:ext>
+            </a:extLst>
+          </a:blip>
+          <a:stretch>
+            <a:fillRect/>
+          </a:stretch>
+        </p:blipFill>
+        <p:spPr>
+          <a:xfrm>
+            <a:off x="7243151" y="1764000"/>
+            <a:ext cx="4091557" cy="10188000"/>
+          </a:xfrm>
+          <a:prstGeom prst="rect">
+            <a:avLst/>
+          </a:prstGeom>
+        </p:spPr>
+      </p:pic>
+      <p:pic>
+        <p:nvPicPr>
+          <p:cNvPr id="6" name="Obraz 5" descr="Obraz zawierający tekst, zrzut ekranu&#10;&#10;Opis wygenerowany automatycznie">
+            <a:extLst>
+              <a:ext uri="{FF2B5EF4-FFF2-40B4-BE49-F238E27FC236}">
+                <a16:creationId xmlns:a16="http://schemas.microsoft.com/office/drawing/2014/main" id="{65FFFCDA-2610-D724-A4EA-89E3A713EA87}"/>
+              </a:ext>
+            </a:extLst>
+          </p:cNvPr>
+          <p:cNvPicPr>
+            <a:picLocks noChangeAspect="1"/>
+          </p:cNvPicPr>
+          <p:nvPr/>
+        </p:nvPicPr>
+        <p:blipFill>
+          <a:blip r:embed="rId4">
+            <a:extLst>
+              <a:ext uri="{28A0092B-C50C-407E-A947-70E740481C1C}">
+                <a14:useLocalDpi xmlns:a14="http://schemas.microsoft.com/office/drawing/2010/main" val="0"/>
+              </a:ext>
+            </a:extLst>
+          </a:blip>
+          <a:stretch>
+            <a:fillRect/>
+          </a:stretch>
+        </p:blipFill>
+        <p:spPr>
+          <a:xfrm>
+            <a:off x="13194994" y="1764000"/>
+            <a:ext cx="5391944" cy="10188000"/>
+          </a:xfrm>
+          <a:prstGeom prst="rect">
+            <a:avLst/>
+          </a:prstGeom>
+        </p:spPr>
+      </p:pic>
     </p:spTree>
     <p:extLst>
       <p:ext uri="{BB962C8B-B14F-4D97-AF65-F5344CB8AC3E}">
-        <p14:creationId xmlns:p14="http://schemas.microsoft.com/office/powerpoint/2010/main" val="1099967194"/>
+        <p14:creationId xmlns:p14="http://schemas.microsoft.com/office/powerpoint/2010/main" val="1355579953"/>
       </p:ext>
     </p:extLst>
   </p:cSld>
   <p:clrMapOvr>
     <a:masterClrMapping/>
   </p:clrMapOvr>
-  <mc:AlternateContent xmlns:mc="http://schemas.openxmlformats.org/markup-compatibility/2006" xmlns:p14="http://schemas.microsoft.com/office/powerpoint/2010/main">
-    <mc:Choice Requires="p14">
+  <mc:AlternateContent xmlns:mc="http://schemas.openxmlformats.org/markup-compatibility/2006">
+    <mc:Choice xmlns:p14="http://schemas.microsoft.com/office/powerpoint/2010/main" Requires="p14">
       <p:transition p14:dur="10"/>
     </mc:Choice>
-    <mc:Fallback xmlns="">
+    <mc:Fallback>
       <p:transition/>
     </mc:Fallback>
   </mc:AlternateContent>
@@ -12525,7 +12700,13 @@
     </p:bg>
     <p:spTree>
       <p:nvGrpSpPr>
-        <p:cNvPr id="1" name=""/>
+        <p:cNvPr id="1" name="">
+          <a:extLst>
+            <a:ext uri="{FF2B5EF4-FFF2-40B4-BE49-F238E27FC236}">
+              <a16:creationId xmlns:a16="http://schemas.microsoft.com/office/drawing/2014/main" id="{A9AC6C1A-B5A2-F114-3CA9-83FFFFAFD3E8}"/>
+            </a:ext>
+          </a:extLst>
+        </p:cNvPr>
         <p:cNvGrpSpPr/>
         <p:nvPr/>
       </p:nvGrpSpPr>
@@ -12537,10 +12718,428 @@
           <a:chExt cx="0" cy="0"/>
         </a:xfrm>
       </p:grpSpPr>
+      <p:sp>
+        <p:nvSpPr>
+          <p:cNvPr id="2" name="TextBox 1">
+            <a:extLst>
+              <a:ext uri="{FF2B5EF4-FFF2-40B4-BE49-F238E27FC236}">
+                <a16:creationId xmlns:a16="http://schemas.microsoft.com/office/drawing/2014/main" id="{954E090B-1DEB-2476-B600-E68BDD77F96E}"/>
+              </a:ext>
+            </a:extLst>
+          </p:cNvPr>
+          <p:cNvSpPr txBox="1"/>
+          <p:nvPr/>
+        </p:nvSpPr>
+        <p:spPr>
+          <a:xfrm>
+            <a:off x="2827292" y="2561209"/>
+            <a:ext cx="15759646" cy="1107996"/>
+          </a:xfrm>
+          <a:prstGeom prst="rect">
+            <a:avLst/>
+          </a:prstGeom>
+          <a:noFill/>
+        </p:spPr>
+        <p:txBody>
+          <a:bodyPr wrap="square" lIns="0" tIns="0" rIns="0" bIns="0" rtlCol="0">
+            <a:spAutoFit/>
+          </a:bodyPr>
+          <a:lstStyle/>
+          <a:p>
+            <a:r>
+              <a:rPr lang="pl-PL" sz="7200" b="1" dirty="0">
+                <a:solidFill>
+                  <a:schemeClr val="bg1"/>
+                </a:solidFill>
+                <a:cs typeface="Poppins SemiBold" panose="02000000000000000000" pitchFamily="2" charset="0"/>
+              </a:rPr>
+              <a:t>YOLOv2 i YOLOv4</a:t>
+            </a:r>
+            <a:endParaRPr lang="en-US" sz="7200" b="1" dirty="0">
+              <a:solidFill>
+                <a:schemeClr val="bg1"/>
+              </a:solidFill>
+              <a:cs typeface="Poppins SemiBold" panose="02000000000000000000" pitchFamily="2" charset="0"/>
+            </a:endParaRPr>
+          </a:p>
+        </p:txBody>
+      </p:sp>
+      <p:cxnSp>
+        <p:nvCxnSpPr>
+          <p:cNvPr id="4" name="Straight Connector 3">
+            <a:extLst>
+              <a:ext uri="{FF2B5EF4-FFF2-40B4-BE49-F238E27FC236}">
+                <a16:creationId xmlns:a16="http://schemas.microsoft.com/office/drawing/2014/main" id="{8C510167-3CAB-D880-3DF2-AD041BA79914}"/>
+              </a:ext>
+            </a:extLst>
+          </p:cNvPr>
+          <p:cNvCxnSpPr/>
+          <p:nvPr/>
+        </p:nvCxnSpPr>
+        <p:spPr>
+          <a:xfrm flipH="1">
+            <a:off x="0" y="3135631"/>
+            <a:ext cx="1674813" cy="0"/>
+          </a:xfrm>
+          <a:prstGeom prst="line">
+            <a:avLst/>
+          </a:prstGeom>
+          <a:ln w="76200">
+            <a:solidFill>
+              <a:srgbClr val="FBBA00"/>
+            </a:solidFill>
+          </a:ln>
+        </p:spPr>
+        <p:style>
+          <a:lnRef idx="1">
+            <a:schemeClr val="accent1"/>
+          </a:lnRef>
+          <a:fillRef idx="0">
+            <a:schemeClr val="accent1"/>
+          </a:fillRef>
+          <a:effectRef idx="0">
+            <a:schemeClr val="accent1"/>
+          </a:effectRef>
+          <a:fontRef idx="minor">
+            <a:schemeClr val="tx1"/>
+          </a:fontRef>
+        </p:style>
+      </p:cxnSp>
+      <p:sp>
+        <p:nvSpPr>
+          <p:cNvPr id="5" name="TextBox 4">
+            <a:extLst>
+              <a:ext uri="{FF2B5EF4-FFF2-40B4-BE49-F238E27FC236}">
+                <a16:creationId xmlns:a16="http://schemas.microsoft.com/office/drawing/2014/main" id="{C970ED69-6BD8-DCF9-AD0D-929B57BF8234}"/>
+              </a:ext>
+            </a:extLst>
+          </p:cNvPr>
+          <p:cNvSpPr txBox="1"/>
+          <p:nvPr/>
+        </p:nvSpPr>
+        <p:spPr>
+          <a:xfrm>
+            <a:off x="2827293" y="6610178"/>
+            <a:ext cx="19880307" cy="3416320"/>
+          </a:xfrm>
+          <a:prstGeom prst="rect">
+            <a:avLst/>
+          </a:prstGeom>
+          <a:noFill/>
+        </p:spPr>
+        <p:txBody>
+          <a:bodyPr wrap="square" lIns="0" tIns="0" rIns="0" bIns="0" rtlCol="0">
+            <a:spAutoFit/>
+          </a:bodyPr>
+          <a:lstStyle/>
+          <a:p>
+            <a:pPr>
+              <a:spcAft>
+                <a:spcPts val="3600"/>
+              </a:spcAft>
+            </a:pPr>
+            <a:r>
+              <a:rPr lang="pl-PL" sz="3200" dirty="0">
+                <a:solidFill>
+                  <a:schemeClr val="bg1"/>
+                </a:solidFill>
+                <a:latin typeface="+mj-lt"/>
+                <a:cs typeface="Poppins" panose="02000000000000000000" pitchFamily="2" charset="0"/>
+              </a:rPr>
+              <a:t>Jak wspomniano, w projekcie skorzystano z dwóch rodzajów detektorów – YOLOv2 i YOLOv4. Wersja 4 jest wersją nowszą, która posiada usprawnienia w porównaniu z siecią YOLOv2. Jednakże, mimo tych poprawek, zachowanie nowszego detektora na zadanym zbiorze było dalekie od oczekiwanego. Detektor YOLOv4 na zadanym zbiorze danych, po procesie uczenia, nie wykrywał obecności żadnego znaku.</a:t>
+            </a:r>
+          </a:p>
+          <a:p>
+            <a:pPr>
+              <a:spcAft>
+                <a:spcPts val="3600"/>
+              </a:spcAft>
+            </a:pPr>
+            <a:r>
+              <a:rPr lang="pl-PL" sz="3200" dirty="0">
+                <a:solidFill>
+                  <a:schemeClr val="bg1"/>
+                </a:solidFill>
+                <a:latin typeface="+mj-lt"/>
+                <a:cs typeface="Poppins" panose="02000000000000000000" pitchFamily="2" charset="0"/>
+              </a:rPr>
+              <a:t>W związku ze złym zachowaniem się nowszego detektora zdecydowano się na skorzystanie z detektora starszego. YOLOv2, który po procesie uczenia prawidłowo wykrywał znaki.</a:t>
+            </a:r>
+          </a:p>
+        </p:txBody>
+      </p:sp>
     </p:spTree>
     <p:extLst>
       <p:ext uri="{BB962C8B-B14F-4D97-AF65-F5344CB8AC3E}">
-        <p14:creationId xmlns:p14="http://schemas.microsoft.com/office/powerpoint/2010/main" val="3482335799"/>
+        <p14:creationId xmlns:p14="http://schemas.microsoft.com/office/powerpoint/2010/main" val="2479049908"/>
+      </p:ext>
+    </p:extLst>
+  </p:cSld>
+  <p:clrMapOvr>
+    <a:masterClrMapping/>
+  </p:clrMapOvr>
+  <mc:AlternateContent xmlns:mc="http://schemas.openxmlformats.org/markup-compatibility/2006" xmlns:p14="http://schemas.microsoft.com/office/powerpoint/2010/main">
+    <mc:Choice Requires="p14">
+      <p:transition p14:dur="10"/>
+    </mc:Choice>
+    <mc:Fallback xmlns="">
+      <p:transition/>
+    </mc:Fallback>
+  </mc:AlternateContent>
+</p:sld>
+</file>
+
+<file path=ppt/slides/slide19.xml><?xml version="1.0" encoding="utf-8"?>
+<p:sld xmlns:a="http://schemas.openxmlformats.org/drawingml/2006/main" xmlns:r="http://schemas.openxmlformats.org/officeDocument/2006/relationships" xmlns:p="http://schemas.openxmlformats.org/presentationml/2006/main" showMasterSp="0">
+  <p:cSld>
+    <p:bg>
+      <p:bgPr>
+        <a:blipFill dpi="0" rotWithShape="1">
+          <a:blip r:embed="rId2">
+            <a:lum/>
+          </a:blip>
+          <a:srcRect/>
+          <a:stretch>
+            <a:fillRect/>
+          </a:stretch>
+        </a:blipFill>
+        <a:effectLst/>
+      </p:bgPr>
+    </p:bg>
+    <p:spTree>
+      <p:nvGrpSpPr>
+        <p:cNvPr id="1" name="">
+          <a:extLst>
+            <a:ext uri="{FF2B5EF4-FFF2-40B4-BE49-F238E27FC236}">
+              <a16:creationId xmlns:a16="http://schemas.microsoft.com/office/drawing/2014/main" id="{EA9EAAF1-5646-F4DA-762C-887939BA151C}"/>
+            </a:ext>
+          </a:extLst>
+        </p:cNvPr>
+        <p:cNvGrpSpPr/>
+        <p:nvPr/>
+      </p:nvGrpSpPr>
+      <p:grpSpPr>
+        <a:xfrm>
+          <a:off x="0" y="0"/>
+          <a:ext cx="0" cy="0"/>
+          <a:chOff x="0" y="0"/>
+          <a:chExt cx="0" cy="0"/>
+        </a:xfrm>
+      </p:grpSpPr>
+      <p:sp>
+        <p:nvSpPr>
+          <p:cNvPr id="2" name="TextBox 1">
+            <a:extLst>
+              <a:ext uri="{FF2B5EF4-FFF2-40B4-BE49-F238E27FC236}">
+                <a16:creationId xmlns:a16="http://schemas.microsoft.com/office/drawing/2014/main" id="{54F70D17-9444-0B3E-B207-0E99C762B6A1}"/>
+              </a:ext>
+            </a:extLst>
+          </p:cNvPr>
+          <p:cNvSpPr txBox="1"/>
+          <p:nvPr/>
+        </p:nvSpPr>
+        <p:spPr>
+          <a:xfrm>
+            <a:off x="2827292" y="2561209"/>
+            <a:ext cx="15759646" cy="1107996"/>
+          </a:xfrm>
+          <a:prstGeom prst="rect">
+            <a:avLst/>
+          </a:prstGeom>
+          <a:noFill/>
+        </p:spPr>
+        <p:txBody>
+          <a:bodyPr wrap="square" lIns="0" tIns="0" rIns="0" bIns="0" rtlCol="0">
+            <a:spAutoFit/>
+          </a:bodyPr>
+          <a:lstStyle/>
+          <a:p>
+            <a:r>
+              <a:rPr lang="pl-PL" sz="7200" b="1" dirty="0">
+                <a:solidFill>
+                  <a:schemeClr val="bg1"/>
+                </a:solidFill>
+                <a:cs typeface="Poppins SemiBold" panose="02000000000000000000" pitchFamily="2" charset="0"/>
+              </a:rPr>
+              <a:t>Detekcja i klasyfikacja</a:t>
+            </a:r>
+            <a:endParaRPr lang="en-US" sz="7200" b="1" dirty="0">
+              <a:solidFill>
+                <a:schemeClr val="bg1"/>
+              </a:solidFill>
+              <a:cs typeface="Poppins SemiBold" panose="02000000000000000000" pitchFamily="2" charset="0"/>
+            </a:endParaRPr>
+          </a:p>
+        </p:txBody>
+      </p:sp>
+      <p:cxnSp>
+        <p:nvCxnSpPr>
+          <p:cNvPr id="4" name="Straight Connector 3">
+            <a:extLst>
+              <a:ext uri="{FF2B5EF4-FFF2-40B4-BE49-F238E27FC236}">
+                <a16:creationId xmlns:a16="http://schemas.microsoft.com/office/drawing/2014/main" id="{653C8521-FA33-3D5B-5727-653DFA875570}"/>
+              </a:ext>
+            </a:extLst>
+          </p:cNvPr>
+          <p:cNvCxnSpPr/>
+          <p:nvPr/>
+        </p:nvCxnSpPr>
+        <p:spPr>
+          <a:xfrm flipH="1">
+            <a:off x="0" y="3135631"/>
+            <a:ext cx="1674813" cy="0"/>
+          </a:xfrm>
+          <a:prstGeom prst="line">
+            <a:avLst/>
+          </a:prstGeom>
+          <a:ln w="76200">
+            <a:solidFill>
+              <a:srgbClr val="FBBA00"/>
+            </a:solidFill>
+          </a:ln>
+        </p:spPr>
+        <p:style>
+          <a:lnRef idx="1">
+            <a:schemeClr val="accent1"/>
+          </a:lnRef>
+          <a:fillRef idx="0">
+            <a:schemeClr val="accent1"/>
+          </a:fillRef>
+          <a:effectRef idx="0">
+            <a:schemeClr val="accent1"/>
+          </a:effectRef>
+          <a:fontRef idx="minor">
+            <a:schemeClr val="tx1"/>
+          </a:fontRef>
+        </p:style>
+      </p:cxnSp>
+      <p:sp>
+        <p:nvSpPr>
+          <p:cNvPr id="5" name="TextBox 4">
+            <a:extLst>
+              <a:ext uri="{FF2B5EF4-FFF2-40B4-BE49-F238E27FC236}">
+                <a16:creationId xmlns:a16="http://schemas.microsoft.com/office/drawing/2014/main" id="{F12F3FF0-75CA-C9CF-DDFC-FC2324EEBF17}"/>
+              </a:ext>
+            </a:extLst>
+          </p:cNvPr>
+          <p:cNvSpPr txBox="1"/>
+          <p:nvPr/>
+        </p:nvSpPr>
+        <p:spPr>
+          <a:xfrm>
+            <a:off x="2827293" y="6610178"/>
+            <a:ext cx="19880307" cy="3908762"/>
+          </a:xfrm>
+          <a:prstGeom prst="rect">
+            <a:avLst/>
+          </a:prstGeom>
+          <a:noFill/>
+        </p:spPr>
+        <p:txBody>
+          <a:bodyPr wrap="square" lIns="0" tIns="0" rIns="0" bIns="0" rtlCol="0">
+            <a:spAutoFit/>
+          </a:bodyPr>
+          <a:lstStyle/>
+          <a:p>
+            <a:pPr>
+              <a:spcAft>
+                <a:spcPts val="3600"/>
+              </a:spcAft>
+            </a:pPr>
+            <a:r>
+              <a:rPr lang="pl-PL" sz="3200" dirty="0">
+                <a:solidFill>
+                  <a:schemeClr val="bg1"/>
+                </a:solidFill>
+                <a:latin typeface="+mj-lt"/>
+                <a:cs typeface="Poppins" panose="02000000000000000000" pitchFamily="2" charset="0"/>
+              </a:rPr>
+              <a:t>W początkowych etapach projektu zakładano, że sieć oparta o model YOLO będzie służyć do wykrywania wszystkich znaków, natomiast model sieci dwunastowarstwowej posłuży do rozpoznawania znaków w obszarach wykrytych przez model YOLO.</a:t>
+            </a:r>
+          </a:p>
+          <a:p>
+            <a:pPr>
+              <a:spcAft>
+                <a:spcPts val="3600"/>
+              </a:spcAft>
+            </a:pPr>
+            <a:r>
+              <a:rPr lang="pl-PL" sz="3200" dirty="0">
+                <a:solidFill>
+                  <a:schemeClr val="bg1"/>
+                </a:solidFill>
+                <a:latin typeface="+mj-lt"/>
+                <a:cs typeface="Poppins" panose="02000000000000000000" pitchFamily="2" charset="0"/>
+              </a:rPr>
+              <a:t>W trakcie tworzenia sieci YOLO okazało się, że użycie podwójnego modelu będzie trudne, natomiast model YOLO był w</a:t>
+            </a:r>
+            <a:r>
+              <a:rPr lang="pl-PL" sz="3200" dirty="0">
+                <a:solidFill>
+                  <a:schemeClr val="bg1"/>
+                </a:solidFill>
+                <a:latin typeface="Calibri" panose="020F0502020204030204" pitchFamily="34" charset="0"/>
+                <a:cs typeface="Calibri" panose="020F0502020204030204" pitchFamily="34" charset="0"/>
+              </a:rPr>
+              <a:t> </a:t>
+            </a:r>
+            <a:r>
+              <a:rPr lang="pl-PL" sz="3200" dirty="0">
+                <a:solidFill>
+                  <a:schemeClr val="bg1"/>
+                </a:solidFill>
+                <a:latin typeface="+mj-lt"/>
+                <a:cs typeface="Poppins" panose="02000000000000000000" pitchFamily="2" charset="0"/>
+              </a:rPr>
+              <a:t>stanie nauczyć się nie tylko detekcji, ale i klasyfikacji znaków znajdujących się w tzw. </a:t>
+            </a:r>
+            <a:r>
+              <a:rPr lang="pl-PL" sz="3200" dirty="0" err="1">
+                <a:solidFill>
+                  <a:schemeClr val="bg1"/>
+                </a:solidFill>
+                <a:latin typeface="+mj-lt"/>
+                <a:cs typeface="Poppins" panose="02000000000000000000" pitchFamily="2" charset="0"/>
+              </a:rPr>
+              <a:t>bounding</a:t>
+            </a:r>
+            <a:r>
+              <a:rPr lang="pl-PL" sz="3200" dirty="0">
+                <a:solidFill>
+                  <a:schemeClr val="bg1"/>
+                </a:solidFill>
+                <a:latin typeface="+mj-lt"/>
+                <a:cs typeface="Poppins" panose="02000000000000000000" pitchFamily="2" charset="0"/>
+              </a:rPr>
+              <a:t> </a:t>
+            </a:r>
+            <a:r>
+              <a:rPr lang="pl-PL" sz="3200" dirty="0" err="1">
+                <a:solidFill>
+                  <a:schemeClr val="bg1"/>
+                </a:solidFill>
+                <a:latin typeface="+mj-lt"/>
+                <a:cs typeface="Poppins" panose="02000000000000000000" pitchFamily="2" charset="0"/>
+              </a:rPr>
+              <a:t>boxach</a:t>
+            </a:r>
+            <a:r>
+              <a:rPr lang="pl-PL" sz="3200" dirty="0">
+                <a:solidFill>
+                  <a:schemeClr val="bg1"/>
+                </a:solidFill>
+                <a:latin typeface="+mj-lt"/>
+                <a:cs typeface="Poppins" panose="02000000000000000000" pitchFamily="2" charset="0"/>
+              </a:rPr>
+              <a:t>. Finalnie oba modele były w stanie rozpoznawać znaki, a różnica polegała na formacie użytego zdjęcia oraz na czasochłonności uczenia się obu sieci.</a:t>
+            </a:r>
+          </a:p>
+        </p:txBody>
+      </p:sp>
+    </p:spTree>
+    <p:extLst>
+      <p:ext uri="{BB962C8B-B14F-4D97-AF65-F5344CB8AC3E}">
+        <p14:creationId xmlns:p14="http://schemas.microsoft.com/office/powerpoint/2010/main" val="1099967194"/>
       </p:ext>
     </p:extLst>
   </p:cSld>
@@ -12776,6 +13375,1470 @@
       <p:transition p14:dur="10"/>
     </mc:Choice>
     <mc:Fallback xmlns="">
+      <p:transition/>
+    </mc:Fallback>
+  </mc:AlternateContent>
+</p:sld>
+</file>
+
+<file path=ppt/slides/slide20.xml><?xml version="1.0" encoding="utf-8"?>
+<p:sld xmlns:a="http://schemas.openxmlformats.org/drawingml/2006/main" xmlns:r="http://schemas.openxmlformats.org/officeDocument/2006/relationships" xmlns:p="http://schemas.openxmlformats.org/presentationml/2006/main" showMasterSp="0">
+  <p:cSld>
+    <p:bg>
+      <p:bgPr>
+        <a:blipFill dpi="0" rotWithShape="1">
+          <a:blip r:embed="rId2">
+            <a:lum/>
+          </a:blip>
+          <a:srcRect/>
+          <a:stretch>
+            <a:fillRect/>
+          </a:stretch>
+        </a:blipFill>
+        <a:effectLst/>
+      </p:bgPr>
+    </p:bg>
+    <p:spTree>
+      <p:nvGrpSpPr>
+        <p:cNvPr id="1" name="">
+          <a:extLst>
+            <a:ext uri="{FF2B5EF4-FFF2-40B4-BE49-F238E27FC236}">
+              <a16:creationId xmlns:a16="http://schemas.microsoft.com/office/drawing/2014/main" id="{724ADF9E-50E3-ED77-C911-53ECB81FAA39}"/>
+            </a:ext>
+          </a:extLst>
+        </p:cNvPr>
+        <p:cNvGrpSpPr/>
+        <p:nvPr/>
+      </p:nvGrpSpPr>
+      <p:grpSpPr>
+        <a:xfrm>
+          <a:off x="0" y="0"/>
+          <a:ext cx="0" cy="0"/>
+          <a:chOff x="0" y="0"/>
+          <a:chExt cx="0" cy="0"/>
+        </a:xfrm>
+      </p:grpSpPr>
+      <p:sp>
+        <p:nvSpPr>
+          <p:cNvPr id="2" name="TextBox 1">
+            <a:extLst>
+              <a:ext uri="{FF2B5EF4-FFF2-40B4-BE49-F238E27FC236}">
+                <a16:creationId xmlns:a16="http://schemas.microsoft.com/office/drawing/2014/main" id="{0964665D-76CF-A160-097E-B976C712C5F2}"/>
+              </a:ext>
+            </a:extLst>
+          </p:cNvPr>
+          <p:cNvSpPr txBox="1"/>
+          <p:nvPr/>
+        </p:nvSpPr>
+        <p:spPr>
+          <a:xfrm>
+            <a:off x="2827292" y="2561209"/>
+            <a:ext cx="15759646" cy="1107996"/>
+          </a:xfrm>
+          <a:prstGeom prst="rect">
+            <a:avLst/>
+          </a:prstGeom>
+          <a:noFill/>
+        </p:spPr>
+        <p:txBody>
+          <a:bodyPr wrap="square" lIns="0" tIns="0" rIns="0" bIns="0" rtlCol="0">
+            <a:spAutoFit/>
+          </a:bodyPr>
+          <a:lstStyle/>
+          <a:p>
+            <a:r>
+              <a:rPr lang="pl-PL" sz="7200" b="1" dirty="0">
+                <a:solidFill>
+                  <a:schemeClr val="bg1"/>
+                </a:solidFill>
+                <a:cs typeface="Poppins SemiBold" panose="02000000000000000000" pitchFamily="2" charset="0"/>
+              </a:rPr>
+              <a:t>Proces uczenia</a:t>
+            </a:r>
+            <a:endParaRPr lang="en-US" sz="7200" b="1" dirty="0">
+              <a:solidFill>
+                <a:schemeClr val="bg1"/>
+              </a:solidFill>
+              <a:cs typeface="Poppins SemiBold" panose="02000000000000000000" pitchFamily="2" charset="0"/>
+            </a:endParaRPr>
+          </a:p>
+        </p:txBody>
+      </p:sp>
+      <p:cxnSp>
+        <p:nvCxnSpPr>
+          <p:cNvPr id="4" name="Straight Connector 3">
+            <a:extLst>
+              <a:ext uri="{FF2B5EF4-FFF2-40B4-BE49-F238E27FC236}">
+                <a16:creationId xmlns:a16="http://schemas.microsoft.com/office/drawing/2014/main" id="{DA3C0881-7BAC-2AAD-DC88-14B8CF531DFD}"/>
+              </a:ext>
+            </a:extLst>
+          </p:cNvPr>
+          <p:cNvCxnSpPr/>
+          <p:nvPr/>
+        </p:nvCxnSpPr>
+        <p:spPr>
+          <a:xfrm flipH="1">
+            <a:off x="0" y="3135631"/>
+            <a:ext cx="1674813" cy="0"/>
+          </a:xfrm>
+          <a:prstGeom prst="line">
+            <a:avLst/>
+          </a:prstGeom>
+          <a:ln w="76200">
+            <a:solidFill>
+              <a:srgbClr val="FBBA00"/>
+            </a:solidFill>
+          </a:ln>
+        </p:spPr>
+        <p:style>
+          <a:lnRef idx="1">
+            <a:schemeClr val="accent1"/>
+          </a:lnRef>
+          <a:fillRef idx="0">
+            <a:schemeClr val="accent1"/>
+          </a:fillRef>
+          <a:effectRef idx="0">
+            <a:schemeClr val="accent1"/>
+          </a:effectRef>
+          <a:fontRef idx="minor">
+            <a:schemeClr val="tx1"/>
+          </a:fontRef>
+        </p:style>
+      </p:cxnSp>
+      <p:sp>
+        <p:nvSpPr>
+          <p:cNvPr id="5" name="TextBox 4">
+            <a:extLst>
+              <a:ext uri="{FF2B5EF4-FFF2-40B4-BE49-F238E27FC236}">
+                <a16:creationId xmlns:a16="http://schemas.microsoft.com/office/drawing/2014/main" id="{6DE07EE5-C52C-E0D9-6716-8025FEEC8992}"/>
+              </a:ext>
+            </a:extLst>
+          </p:cNvPr>
+          <p:cNvSpPr txBox="1"/>
+          <p:nvPr/>
+        </p:nvSpPr>
+        <p:spPr>
+          <a:xfrm>
+            <a:off x="2827293" y="6610178"/>
+            <a:ext cx="19880307" cy="2923877"/>
+          </a:xfrm>
+          <a:prstGeom prst="rect">
+            <a:avLst/>
+          </a:prstGeom>
+          <a:noFill/>
+        </p:spPr>
+        <p:txBody>
+          <a:bodyPr wrap="square" lIns="0" tIns="0" rIns="0" bIns="0" rtlCol="0">
+            <a:spAutoFit/>
+          </a:bodyPr>
+          <a:lstStyle/>
+          <a:p>
+            <a:pPr>
+              <a:spcAft>
+                <a:spcPts val="3600"/>
+              </a:spcAft>
+            </a:pPr>
+            <a:r>
+              <a:rPr lang="pl-PL" sz="3200" dirty="0">
+                <a:solidFill>
+                  <a:schemeClr val="bg1"/>
+                </a:solidFill>
+                <a:latin typeface="+mj-lt"/>
+                <a:cs typeface="Poppins" panose="02000000000000000000" pitchFamily="2" charset="0"/>
+              </a:rPr>
+              <a:t>Ze względu na złożoność sieci, a więc i modelu oraz duże rozmiary użytych danych wejściowych, parametry uczenia sieci z</a:t>
+            </a:r>
+            <a:r>
+              <a:rPr lang="pl-PL" sz="3200" dirty="0">
+                <a:solidFill>
+                  <a:schemeClr val="bg1"/>
+                </a:solidFill>
+                <a:latin typeface="Calibri" panose="020F0502020204030204" pitchFamily="34" charset="0"/>
+                <a:cs typeface="Calibri" panose="020F0502020204030204" pitchFamily="34" charset="0"/>
+              </a:rPr>
+              <a:t> </a:t>
+            </a:r>
+            <a:r>
+              <a:rPr lang="pl-PL" sz="3200" dirty="0">
+                <a:solidFill>
+                  <a:schemeClr val="bg1"/>
+                </a:solidFill>
+                <a:latin typeface="+mj-lt"/>
+                <a:cs typeface="Poppins" panose="02000000000000000000" pitchFamily="2" charset="0"/>
+              </a:rPr>
+              <a:t>detektorem YOLO były znacznie różne od parametrów prostej sieci dwunastowarstwowej. </a:t>
+            </a:r>
+          </a:p>
+          <a:p>
+            <a:pPr>
+              <a:spcAft>
+                <a:spcPts val="3600"/>
+              </a:spcAft>
+            </a:pPr>
+            <a:r>
+              <a:rPr lang="pl-PL" sz="3200" dirty="0">
+                <a:solidFill>
+                  <a:schemeClr val="bg1"/>
+                </a:solidFill>
+                <a:latin typeface="+mj-lt"/>
+                <a:cs typeface="Poppins" panose="02000000000000000000" pitchFamily="2" charset="0"/>
+              </a:rPr>
+              <a:t>Zmianie podlegały trzy parametry – rozmiar serii danych uczących (</a:t>
+            </a:r>
+            <a:r>
+              <a:rPr lang="pl-PL" sz="3200" dirty="0" err="1">
+                <a:solidFill>
+                  <a:schemeClr val="bg1"/>
+                </a:solidFill>
+                <a:latin typeface="+mj-lt"/>
+                <a:cs typeface="Poppins" panose="02000000000000000000" pitchFamily="2" charset="0"/>
+              </a:rPr>
+              <a:t>batch</a:t>
+            </a:r>
+            <a:r>
+              <a:rPr lang="pl-PL" sz="3200" dirty="0">
+                <a:solidFill>
+                  <a:schemeClr val="bg1"/>
+                </a:solidFill>
+                <a:latin typeface="+mj-lt"/>
+                <a:cs typeface="Poppins" panose="02000000000000000000" pitchFamily="2" charset="0"/>
+              </a:rPr>
+              <a:t> </a:t>
+            </a:r>
+            <a:r>
+              <a:rPr lang="pl-PL" sz="3200" dirty="0" err="1">
+                <a:solidFill>
+                  <a:schemeClr val="bg1"/>
+                </a:solidFill>
+                <a:latin typeface="+mj-lt"/>
+                <a:cs typeface="Poppins" panose="02000000000000000000" pitchFamily="2" charset="0"/>
+              </a:rPr>
+              <a:t>size</a:t>
+            </a:r>
+            <a:r>
+              <a:rPr lang="pl-PL" sz="3200" dirty="0">
+                <a:solidFill>
+                  <a:schemeClr val="bg1"/>
+                </a:solidFill>
+                <a:latin typeface="+mj-lt"/>
+                <a:cs typeface="Poppins" panose="02000000000000000000" pitchFamily="2" charset="0"/>
+              </a:rPr>
+              <a:t>), początkowa szybkość uczenia oraz maksymalna liczba epok. Rozmiar serii danych został ustalony na 16 sztuk, początkowa szybkość na 0.001, natomiast maksymalna liczba epok wynosiła 300.</a:t>
+            </a:r>
+          </a:p>
+        </p:txBody>
+      </p:sp>
+    </p:spTree>
+    <p:extLst>
+      <p:ext uri="{BB962C8B-B14F-4D97-AF65-F5344CB8AC3E}">
+        <p14:creationId xmlns:p14="http://schemas.microsoft.com/office/powerpoint/2010/main" val="411040886"/>
+      </p:ext>
+    </p:extLst>
+  </p:cSld>
+  <p:clrMapOvr>
+    <a:masterClrMapping/>
+  </p:clrMapOvr>
+  <mc:AlternateContent xmlns:mc="http://schemas.openxmlformats.org/markup-compatibility/2006">
+    <mc:Choice xmlns:p14="http://schemas.microsoft.com/office/powerpoint/2010/main" Requires="p14">
+      <p:transition p14:dur="10"/>
+    </mc:Choice>
+    <mc:Fallback>
+      <p:transition/>
+    </mc:Fallback>
+  </mc:AlternateContent>
+</p:sld>
+</file>
+
+<file path=ppt/slides/slide21.xml><?xml version="1.0" encoding="utf-8"?>
+<p:sld xmlns:a="http://schemas.openxmlformats.org/drawingml/2006/main" xmlns:r="http://schemas.openxmlformats.org/officeDocument/2006/relationships" xmlns:p="http://schemas.openxmlformats.org/presentationml/2006/main" showMasterSp="0">
+  <p:cSld>
+    <p:bg>
+      <p:bgPr>
+        <a:blipFill dpi="0" rotWithShape="1">
+          <a:blip r:embed="rId2">
+            <a:lum/>
+          </a:blip>
+          <a:srcRect/>
+          <a:stretch>
+            <a:fillRect/>
+          </a:stretch>
+        </a:blipFill>
+        <a:effectLst/>
+      </p:bgPr>
+    </p:bg>
+    <p:spTree>
+      <p:nvGrpSpPr>
+        <p:cNvPr id="1" name="">
+          <a:extLst>
+            <a:ext uri="{FF2B5EF4-FFF2-40B4-BE49-F238E27FC236}">
+              <a16:creationId xmlns:a16="http://schemas.microsoft.com/office/drawing/2014/main" id="{1E4A1D93-4292-0B72-569F-A230CEA5400D}"/>
+            </a:ext>
+          </a:extLst>
+        </p:cNvPr>
+        <p:cNvGrpSpPr/>
+        <p:nvPr/>
+      </p:nvGrpSpPr>
+      <p:grpSpPr>
+        <a:xfrm>
+          <a:off x="0" y="0"/>
+          <a:ext cx="0" cy="0"/>
+          <a:chOff x="0" y="0"/>
+          <a:chExt cx="0" cy="0"/>
+        </a:xfrm>
+      </p:grpSpPr>
+      <p:sp>
+        <p:nvSpPr>
+          <p:cNvPr id="2" name="TextBox 1">
+            <a:extLst>
+              <a:ext uri="{FF2B5EF4-FFF2-40B4-BE49-F238E27FC236}">
+                <a16:creationId xmlns:a16="http://schemas.microsoft.com/office/drawing/2014/main" id="{5C052BD4-474E-89C1-5916-766A3DE7D095}"/>
+              </a:ext>
+            </a:extLst>
+          </p:cNvPr>
+          <p:cNvSpPr txBox="1"/>
+          <p:nvPr/>
+        </p:nvSpPr>
+        <p:spPr>
+          <a:xfrm>
+            <a:off x="2827292" y="2561209"/>
+            <a:ext cx="15759646" cy="1107996"/>
+          </a:xfrm>
+          <a:prstGeom prst="rect">
+            <a:avLst/>
+          </a:prstGeom>
+          <a:noFill/>
+        </p:spPr>
+        <p:txBody>
+          <a:bodyPr wrap="square" lIns="0" tIns="0" rIns="0" bIns="0" rtlCol="0">
+            <a:spAutoFit/>
+          </a:bodyPr>
+          <a:lstStyle/>
+          <a:p>
+            <a:r>
+              <a:rPr lang="pl-PL" sz="7200" b="1" dirty="0">
+                <a:solidFill>
+                  <a:schemeClr val="bg1"/>
+                </a:solidFill>
+                <a:cs typeface="Poppins SemiBold" panose="02000000000000000000" pitchFamily="2" charset="0"/>
+              </a:rPr>
+              <a:t>Detekcja i klasyfikacja</a:t>
+            </a:r>
+            <a:endParaRPr lang="en-US" sz="7200" b="1" dirty="0">
+              <a:solidFill>
+                <a:schemeClr val="bg1"/>
+              </a:solidFill>
+              <a:cs typeface="Poppins SemiBold" panose="02000000000000000000" pitchFamily="2" charset="0"/>
+            </a:endParaRPr>
+          </a:p>
+        </p:txBody>
+      </p:sp>
+      <p:cxnSp>
+        <p:nvCxnSpPr>
+          <p:cNvPr id="4" name="Straight Connector 3">
+            <a:extLst>
+              <a:ext uri="{FF2B5EF4-FFF2-40B4-BE49-F238E27FC236}">
+                <a16:creationId xmlns:a16="http://schemas.microsoft.com/office/drawing/2014/main" id="{418CA6C2-9B7B-9702-F812-DD3757D74175}"/>
+              </a:ext>
+            </a:extLst>
+          </p:cNvPr>
+          <p:cNvCxnSpPr/>
+          <p:nvPr/>
+        </p:nvCxnSpPr>
+        <p:spPr>
+          <a:xfrm flipH="1">
+            <a:off x="0" y="3135631"/>
+            <a:ext cx="1674813" cy="0"/>
+          </a:xfrm>
+          <a:prstGeom prst="line">
+            <a:avLst/>
+          </a:prstGeom>
+          <a:ln w="76200">
+            <a:solidFill>
+              <a:srgbClr val="FBBA00"/>
+            </a:solidFill>
+          </a:ln>
+        </p:spPr>
+        <p:style>
+          <a:lnRef idx="1">
+            <a:schemeClr val="accent1"/>
+          </a:lnRef>
+          <a:fillRef idx="0">
+            <a:schemeClr val="accent1"/>
+          </a:fillRef>
+          <a:effectRef idx="0">
+            <a:schemeClr val="accent1"/>
+          </a:effectRef>
+          <a:fontRef idx="minor">
+            <a:schemeClr val="tx1"/>
+          </a:fontRef>
+        </p:style>
+      </p:cxnSp>
+      <p:sp>
+        <p:nvSpPr>
+          <p:cNvPr id="5" name="TextBox 4">
+            <a:extLst>
+              <a:ext uri="{FF2B5EF4-FFF2-40B4-BE49-F238E27FC236}">
+                <a16:creationId xmlns:a16="http://schemas.microsoft.com/office/drawing/2014/main" id="{FCC60A55-CE07-2B78-F017-3500B91FDA11}"/>
+              </a:ext>
+            </a:extLst>
+          </p:cNvPr>
+          <p:cNvSpPr txBox="1"/>
+          <p:nvPr/>
+        </p:nvSpPr>
+        <p:spPr>
+          <a:xfrm>
+            <a:off x="2827293" y="6610178"/>
+            <a:ext cx="19880307" cy="3908762"/>
+          </a:xfrm>
+          <a:prstGeom prst="rect">
+            <a:avLst/>
+          </a:prstGeom>
+          <a:noFill/>
+        </p:spPr>
+        <p:txBody>
+          <a:bodyPr wrap="square" lIns="0" tIns="0" rIns="0" bIns="0" rtlCol="0">
+            <a:spAutoFit/>
+          </a:bodyPr>
+          <a:lstStyle/>
+          <a:p>
+            <a:pPr>
+              <a:spcAft>
+                <a:spcPts val="3600"/>
+              </a:spcAft>
+            </a:pPr>
+            <a:r>
+              <a:rPr lang="pl-PL" sz="3200" dirty="0">
+                <a:solidFill>
+                  <a:schemeClr val="bg1"/>
+                </a:solidFill>
+                <a:latin typeface="+mj-lt"/>
+                <a:cs typeface="Poppins" panose="02000000000000000000" pitchFamily="2" charset="0"/>
+              </a:rPr>
+              <a:t>W początkowych etapach projektu zakładano, że sieć oparta o model YOLO będzie służyć do wykrywania wszystkich znaków, natomiast model sieci dwunastowarstwowej posłuży do rozpoznawania znaków w obszarach wykrytych przez model YOLO.</a:t>
+            </a:r>
+          </a:p>
+          <a:p>
+            <a:pPr>
+              <a:spcAft>
+                <a:spcPts val="3600"/>
+              </a:spcAft>
+            </a:pPr>
+            <a:r>
+              <a:rPr lang="pl-PL" sz="3200" dirty="0">
+                <a:solidFill>
+                  <a:schemeClr val="bg1"/>
+                </a:solidFill>
+                <a:latin typeface="+mj-lt"/>
+                <a:cs typeface="Poppins" panose="02000000000000000000" pitchFamily="2" charset="0"/>
+              </a:rPr>
+              <a:t>W trakcie tworzenia sieci YOLO okazało się, że użycie podwójnego modelu będzie trudne, natomiast model YOLO był w</a:t>
+            </a:r>
+            <a:r>
+              <a:rPr lang="pl-PL" sz="3200" dirty="0">
+                <a:solidFill>
+                  <a:schemeClr val="bg1"/>
+                </a:solidFill>
+                <a:latin typeface="Calibri" panose="020F0502020204030204" pitchFamily="34" charset="0"/>
+                <a:cs typeface="Calibri" panose="020F0502020204030204" pitchFamily="34" charset="0"/>
+              </a:rPr>
+              <a:t> </a:t>
+            </a:r>
+            <a:r>
+              <a:rPr lang="pl-PL" sz="3200" dirty="0">
+                <a:solidFill>
+                  <a:schemeClr val="bg1"/>
+                </a:solidFill>
+                <a:latin typeface="+mj-lt"/>
+                <a:cs typeface="Poppins" panose="02000000000000000000" pitchFamily="2" charset="0"/>
+              </a:rPr>
+              <a:t>stanie nauczyć się nie tylko detekcji, ale i klasyfikacji znaków znajdujących się w tzw. </a:t>
+            </a:r>
+            <a:r>
+              <a:rPr lang="pl-PL" sz="3200" dirty="0" err="1">
+                <a:solidFill>
+                  <a:schemeClr val="bg1"/>
+                </a:solidFill>
+                <a:latin typeface="+mj-lt"/>
+                <a:cs typeface="Poppins" panose="02000000000000000000" pitchFamily="2" charset="0"/>
+              </a:rPr>
+              <a:t>bounding</a:t>
+            </a:r>
+            <a:r>
+              <a:rPr lang="pl-PL" sz="3200" dirty="0">
+                <a:solidFill>
+                  <a:schemeClr val="bg1"/>
+                </a:solidFill>
+                <a:latin typeface="+mj-lt"/>
+                <a:cs typeface="Poppins" panose="02000000000000000000" pitchFamily="2" charset="0"/>
+              </a:rPr>
+              <a:t> </a:t>
+            </a:r>
+            <a:r>
+              <a:rPr lang="pl-PL" sz="3200" dirty="0" err="1">
+                <a:solidFill>
+                  <a:schemeClr val="bg1"/>
+                </a:solidFill>
+                <a:latin typeface="+mj-lt"/>
+                <a:cs typeface="Poppins" panose="02000000000000000000" pitchFamily="2" charset="0"/>
+              </a:rPr>
+              <a:t>boxach</a:t>
+            </a:r>
+            <a:r>
+              <a:rPr lang="pl-PL" sz="3200" dirty="0">
+                <a:solidFill>
+                  <a:schemeClr val="bg1"/>
+                </a:solidFill>
+                <a:latin typeface="+mj-lt"/>
+                <a:cs typeface="Poppins" panose="02000000000000000000" pitchFamily="2" charset="0"/>
+              </a:rPr>
+              <a:t>. Finalnie oba modele były w stanie rozpoznawać znaki, a różnica polegała na formacie użytego zdjęcia oraz na czasochłonności uczenia się obu sieci.</a:t>
+            </a:r>
+          </a:p>
+        </p:txBody>
+      </p:sp>
+    </p:spTree>
+    <p:extLst>
+      <p:ext uri="{BB962C8B-B14F-4D97-AF65-F5344CB8AC3E}">
+        <p14:creationId xmlns:p14="http://schemas.microsoft.com/office/powerpoint/2010/main" val="1722136704"/>
+      </p:ext>
+    </p:extLst>
+  </p:cSld>
+  <p:clrMapOvr>
+    <a:masterClrMapping/>
+  </p:clrMapOvr>
+  <mc:AlternateContent xmlns:mc="http://schemas.openxmlformats.org/markup-compatibility/2006">
+    <mc:Choice xmlns:p14="http://schemas.microsoft.com/office/powerpoint/2010/main" Requires="p14">
+      <p:transition p14:dur="10"/>
+    </mc:Choice>
+    <mc:Fallback>
+      <p:transition/>
+    </mc:Fallback>
+  </mc:AlternateContent>
+</p:sld>
+</file>
+
+<file path=ppt/slides/slide22.xml><?xml version="1.0" encoding="utf-8"?>
+<p:sld xmlns:a="http://schemas.openxmlformats.org/drawingml/2006/main" xmlns:r="http://schemas.openxmlformats.org/officeDocument/2006/relationships" xmlns:p="http://schemas.openxmlformats.org/presentationml/2006/main" showMasterSp="0">
+  <p:cSld>
+    <p:bg>
+      <p:bgPr>
+        <a:blipFill dpi="0" rotWithShape="1">
+          <a:blip r:embed="rId2">
+            <a:lum/>
+          </a:blip>
+          <a:srcRect/>
+          <a:stretch>
+            <a:fillRect/>
+          </a:stretch>
+        </a:blipFill>
+        <a:effectLst/>
+      </p:bgPr>
+    </p:bg>
+    <p:spTree>
+      <p:nvGrpSpPr>
+        <p:cNvPr id="1" name="">
+          <a:extLst>
+            <a:ext uri="{FF2B5EF4-FFF2-40B4-BE49-F238E27FC236}">
+              <a16:creationId xmlns:a16="http://schemas.microsoft.com/office/drawing/2014/main" id="{90B55E5C-7EC3-AD09-A936-6B3D5AEED7FA}"/>
+            </a:ext>
+          </a:extLst>
+        </p:cNvPr>
+        <p:cNvGrpSpPr/>
+        <p:nvPr/>
+      </p:nvGrpSpPr>
+      <p:grpSpPr>
+        <a:xfrm>
+          <a:off x="0" y="0"/>
+          <a:ext cx="0" cy="0"/>
+          <a:chOff x="0" y="0"/>
+          <a:chExt cx="0" cy="0"/>
+        </a:xfrm>
+      </p:grpSpPr>
+      <p:sp>
+        <p:nvSpPr>
+          <p:cNvPr id="2" name="TextBox 1">
+            <a:extLst>
+              <a:ext uri="{FF2B5EF4-FFF2-40B4-BE49-F238E27FC236}">
+                <a16:creationId xmlns:a16="http://schemas.microsoft.com/office/drawing/2014/main" id="{A65DE495-5C9A-6968-BC50-451CF4E4CD8E}"/>
+              </a:ext>
+            </a:extLst>
+          </p:cNvPr>
+          <p:cNvSpPr txBox="1"/>
+          <p:nvPr/>
+        </p:nvSpPr>
+        <p:spPr>
+          <a:xfrm>
+            <a:off x="2827292" y="2561209"/>
+            <a:ext cx="15759646" cy="1107996"/>
+          </a:xfrm>
+          <a:prstGeom prst="rect">
+            <a:avLst/>
+          </a:prstGeom>
+          <a:noFill/>
+        </p:spPr>
+        <p:txBody>
+          <a:bodyPr wrap="square" lIns="0" tIns="0" rIns="0" bIns="0" rtlCol="0">
+            <a:spAutoFit/>
+          </a:bodyPr>
+          <a:lstStyle/>
+          <a:p>
+            <a:r>
+              <a:rPr lang="pl-PL" sz="7200" b="1" dirty="0">
+                <a:solidFill>
+                  <a:schemeClr val="bg1"/>
+                </a:solidFill>
+                <a:cs typeface="Poppins SemiBold" panose="02000000000000000000" pitchFamily="2" charset="0"/>
+              </a:rPr>
+              <a:t>Wyniki YOLOv2</a:t>
+            </a:r>
+            <a:endParaRPr lang="en-US" sz="7200" b="1" dirty="0">
+              <a:solidFill>
+                <a:schemeClr val="bg1"/>
+              </a:solidFill>
+              <a:cs typeface="Poppins SemiBold" panose="02000000000000000000" pitchFamily="2" charset="0"/>
+            </a:endParaRPr>
+          </a:p>
+        </p:txBody>
+      </p:sp>
+      <p:cxnSp>
+        <p:nvCxnSpPr>
+          <p:cNvPr id="4" name="Straight Connector 3">
+            <a:extLst>
+              <a:ext uri="{FF2B5EF4-FFF2-40B4-BE49-F238E27FC236}">
+                <a16:creationId xmlns:a16="http://schemas.microsoft.com/office/drawing/2014/main" id="{2D73E539-20C4-E675-24F8-C3C7689CE5C3}"/>
+              </a:ext>
+            </a:extLst>
+          </p:cNvPr>
+          <p:cNvCxnSpPr/>
+          <p:nvPr/>
+        </p:nvCxnSpPr>
+        <p:spPr>
+          <a:xfrm flipH="1">
+            <a:off x="0" y="3135631"/>
+            <a:ext cx="1674813" cy="0"/>
+          </a:xfrm>
+          <a:prstGeom prst="line">
+            <a:avLst/>
+          </a:prstGeom>
+          <a:ln w="76200">
+            <a:solidFill>
+              <a:srgbClr val="FBBA00"/>
+            </a:solidFill>
+          </a:ln>
+        </p:spPr>
+        <p:style>
+          <a:lnRef idx="1">
+            <a:schemeClr val="accent1"/>
+          </a:lnRef>
+          <a:fillRef idx="0">
+            <a:schemeClr val="accent1"/>
+          </a:fillRef>
+          <a:effectRef idx="0">
+            <a:schemeClr val="accent1"/>
+          </a:effectRef>
+          <a:fontRef idx="minor">
+            <a:schemeClr val="tx1"/>
+          </a:fontRef>
+        </p:style>
+      </p:cxnSp>
+      <p:sp>
+        <p:nvSpPr>
+          <p:cNvPr id="5" name="TextBox 4">
+            <a:extLst>
+              <a:ext uri="{FF2B5EF4-FFF2-40B4-BE49-F238E27FC236}">
+                <a16:creationId xmlns:a16="http://schemas.microsoft.com/office/drawing/2014/main" id="{11B225DA-A282-D6D1-8A03-FC8A6B72E0C6}"/>
+              </a:ext>
+            </a:extLst>
+          </p:cNvPr>
+          <p:cNvSpPr txBox="1"/>
+          <p:nvPr/>
+        </p:nvSpPr>
+        <p:spPr>
+          <a:xfrm>
+            <a:off x="2827293" y="6610178"/>
+            <a:ext cx="19880307" cy="4401205"/>
+          </a:xfrm>
+          <a:prstGeom prst="rect">
+            <a:avLst/>
+          </a:prstGeom>
+          <a:noFill/>
+        </p:spPr>
+        <p:txBody>
+          <a:bodyPr wrap="square" lIns="0" tIns="0" rIns="0" bIns="0" rtlCol="0">
+            <a:spAutoFit/>
+          </a:bodyPr>
+          <a:lstStyle/>
+          <a:p>
+            <a:pPr>
+              <a:spcAft>
+                <a:spcPts val="3600"/>
+              </a:spcAft>
+            </a:pPr>
+            <a:r>
+              <a:rPr lang="pl-PL" sz="3200" dirty="0">
+                <a:solidFill>
+                  <a:schemeClr val="bg1"/>
+                </a:solidFill>
+                <a:latin typeface="+mj-lt"/>
+                <a:cs typeface="Poppins" panose="02000000000000000000" pitchFamily="2" charset="0"/>
+              </a:rPr>
+              <a:t>W przeciwieństwie do prostej sieci, sieć w oparciu o detektor YOLO należy oceniać przy użyciu wskaźnika precyzji predykcji. Wskaźnik ten stwierdza, jaka jest różnica pomiędzy współrzędnymi rzeczywistego </a:t>
+            </a:r>
+            <a:r>
+              <a:rPr lang="pl-PL" sz="3200" dirty="0" err="1">
+                <a:solidFill>
+                  <a:schemeClr val="bg1"/>
+                </a:solidFill>
+                <a:latin typeface="+mj-lt"/>
+                <a:cs typeface="Poppins" panose="02000000000000000000" pitchFamily="2" charset="0"/>
+              </a:rPr>
+              <a:t>bounding</a:t>
+            </a:r>
+            <a:r>
+              <a:rPr lang="pl-PL" sz="3200" dirty="0">
+                <a:solidFill>
+                  <a:schemeClr val="bg1"/>
+                </a:solidFill>
+                <a:latin typeface="+mj-lt"/>
+                <a:cs typeface="Poppins" panose="02000000000000000000" pitchFamily="2" charset="0"/>
+              </a:rPr>
+              <a:t> </a:t>
+            </a:r>
+            <a:r>
+              <a:rPr lang="pl-PL" sz="3200" dirty="0" err="1">
+                <a:solidFill>
+                  <a:schemeClr val="bg1"/>
+                </a:solidFill>
+                <a:latin typeface="+mj-lt"/>
+                <a:cs typeface="Poppins" panose="02000000000000000000" pitchFamily="2" charset="0"/>
+              </a:rPr>
+              <a:t>boxa</a:t>
+            </a:r>
+            <a:r>
+              <a:rPr lang="pl-PL" sz="3200" dirty="0">
+                <a:solidFill>
+                  <a:schemeClr val="bg1"/>
+                </a:solidFill>
+                <a:latin typeface="+mj-lt"/>
+                <a:cs typeface="Poppins" panose="02000000000000000000" pitchFamily="2" charset="0"/>
+              </a:rPr>
+              <a:t> i</a:t>
+            </a:r>
+            <a:r>
+              <a:rPr lang="pl-PL" sz="3200" dirty="0">
+                <a:solidFill>
+                  <a:schemeClr val="bg1"/>
+                </a:solidFill>
+                <a:latin typeface="Calibri" panose="020F0502020204030204" pitchFamily="34" charset="0"/>
+                <a:cs typeface="Calibri" panose="020F0502020204030204" pitchFamily="34" charset="0"/>
+              </a:rPr>
+              <a:t> </a:t>
+            </a:r>
+            <a:r>
+              <a:rPr lang="pl-PL" sz="3200" dirty="0">
+                <a:solidFill>
+                  <a:schemeClr val="bg1"/>
+                </a:solidFill>
+                <a:latin typeface="+mj-lt"/>
+                <a:cs typeface="Poppins" panose="02000000000000000000" pitchFamily="2" charset="0"/>
+              </a:rPr>
+              <a:t>współrzędnymi przewidywanego </a:t>
+            </a:r>
+            <a:r>
+              <a:rPr lang="pl-PL" sz="3200" dirty="0" err="1">
+                <a:solidFill>
+                  <a:schemeClr val="bg1"/>
+                </a:solidFill>
+                <a:latin typeface="+mj-lt"/>
+                <a:cs typeface="Poppins" panose="02000000000000000000" pitchFamily="2" charset="0"/>
+              </a:rPr>
+              <a:t>bounding</a:t>
+            </a:r>
+            <a:r>
+              <a:rPr lang="pl-PL" sz="3200" dirty="0">
+                <a:solidFill>
+                  <a:schemeClr val="bg1"/>
+                </a:solidFill>
+                <a:latin typeface="+mj-lt"/>
+                <a:cs typeface="Poppins" panose="02000000000000000000" pitchFamily="2" charset="0"/>
+              </a:rPr>
+              <a:t> </a:t>
+            </a:r>
+            <a:r>
+              <a:rPr lang="pl-PL" sz="3200" dirty="0" err="1">
+                <a:solidFill>
+                  <a:schemeClr val="bg1"/>
+                </a:solidFill>
+                <a:latin typeface="+mj-lt"/>
+                <a:cs typeface="Poppins" panose="02000000000000000000" pitchFamily="2" charset="0"/>
+              </a:rPr>
+              <a:t>boxa</a:t>
+            </a:r>
+            <a:r>
+              <a:rPr lang="pl-PL" sz="3200" dirty="0">
+                <a:solidFill>
+                  <a:schemeClr val="bg1"/>
+                </a:solidFill>
+                <a:latin typeface="+mj-lt"/>
+                <a:cs typeface="Poppins" panose="02000000000000000000" pitchFamily="2" charset="0"/>
+              </a:rPr>
+              <a:t>. Średnio wartość ta wyniosła 63%, co jest bardzo dobrym wynikiem dla tego rodzaju obiektów.</a:t>
+            </a:r>
+          </a:p>
+          <a:p>
+            <a:pPr>
+              <a:spcAft>
+                <a:spcPts val="3600"/>
+              </a:spcAft>
+            </a:pPr>
+            <a:r>
+              <a:rPr lang="pl-PL" sz="3200" dirty="0">
+                <a:solidFill>
+                  <a:schemeClr val="bg1"/>
+                </a:solidFill>
+                <a:latin typeface="+mj-lt"/>
+                <a:cs typeface="Poppins" panose="02000000000000000000" pitchFamily="2" charset="0"/>
+              </a:rPr>
+              <a:t>Należy również pamiętać, że realnie nie jest możliwe uzyskanie średniego wskaźnika precyzji na poziomie 100%, ponieważ w rzeczywistych przypadkach będzie istniało co najmniej jedno prawidłowe oznaczenie obiektu na podstawie modelu, które będzie różne od zadanego (wzorcowego) oznaczenia, na przykład przez przesunięcie bądź też powiększenie względem wzorca.</a:t>
+            </a:r>
+          </a:p>
+        </p:txBody>
+      </p:sp>
+    </p:spTree>
+    <p:extLst>
+      <p:ext uri="{BB962C8B-B14F-4D97-AF65-F5344CB8AC3E}">
+        <p14:creationId xmlns:p14="http://schemas.microsoft.com/office/powerpoint/2010/main" val="540942062"/>
+      </p:ext>
+    </p:extLst>
+  </p:cSld>
+  <p:clrMapOvr>
+    <a:masterClrMapping/>
+  </p:clrMapOvr>
+  <mc:AlternateContent xmlns:mc="http://schemas.openxmlformats.org/markup-compatibility/2006">
+    <mc:Choice xmlns:p14="http://schemas.microsoft.com/office/powerpoint/2010/main" Requires="p14">
+      <p:transition p14:dur="10"/>
+    </mc:Choice>
+    <mc:Fallback>
+      <p:transition/>
+    </mc:Fallback>
+  </mc:AlternateContent>
+</p:sld>
+</file>
+
+<file path=ppt/slides/slide23.xml><?xml version="1.0" encoding="utf-8"?>
+<p:sld xmlns:a="http://schemas.openxmlformats.org/drawingml/2006/main" xmlns:r="http://schemas.openxmlformats.org/officeDocument/2006/relationships" xmlns:p="http://schemas.openxmlformats.org/presentationml/2006/main" showMasterSp="0">
+  <p:cSld>
+    <p:bg>
+      <p:bgPr>
+        <a:blipFill dpi="0" rotWithShape="1">
+          <a:blip r:embed="rId2">
+            <a:lum/>
+          </a:blip>
+          <a:srcRect/>
+          <a:stretch>
+            <a:fillRect/>
+          </a:stretch>
+        </a:blipFill>
+        <a:effectLst/>
+      </p:bgPr>
+    </p:bg>
+    <p:spTree>
+      <p:nvGrpSpPr>
+        <p:cNvPr id="1" name="">
+          <a:extLst>
+            <a:ext uri="{FF2B5EF4-FFF2-40B4-BE49-F238E27FC236}">
+              <a16:creationId xmlns:a16="http://schemas.microsoft.com/office/drawing/2014/main" id="{CC6619BE-1363-2EA9-F5DF-B2126339DCE4}"/>
+            </a:ext>
+          </a:extLst>
+        </p:cNvPr>
+        <p:cNvGrpSpPr/>
+        <p:nvPr/>
+      </p:nvGrpSpPr>
+      <p:grpSpPr>
+        <a:xfrm>
+          <a:off x="0" y="0"/>
+          <a:ext cx="0" cy="0"/>
+          <a:chOff x="0" y="0"/>
+          <a:chExt cx="0" cy="0"/>
+        </a:xfrm>
+      </p:grpSpPr>
+      <p:sp>
+        <p:nvSpPr>
+          <p:cNvPr id="2" name="TextBox 1">
+            <a:extLst>
+              <a:ext uri="{FF2B5EF4-FFF2-40B4-BE49-F238E27FC236}">
+                <a16:creationId xmlns:a16="http://schemas.microsoft.com/office/drawing/2014/main" id="{E55D8275-9F5E-4682-F3E8-06B932FC4F43}"/>
+              </a:ext>
+            </a:extLst>
+          </p:cNvPr>
+          <p:cNvSpPr txBox="1"/>
+          <p:nvPr/>
+        </p:nvSpPr>
+        <p:spPr>
+          <a:xfrm>
+            <a:off x="2827292" y="433464"/>
+            <a:ext cx="15759646" cy="1107996"/>
+          </a:xfrm>
+          <a:prstGeom prst="rect">
+            <a:avLst/>
+          </a:prstGeom>
+          <a:noFill/>
+        </p:spPr>
+        <p:txBody>
+          <a:bodyPr wrap="square" lIns="0" tIns="0" rIns="0" bIns="0" rtlCol="0">
+            <a:spAutoFit/>
+          </a:bodyPr>
+          <a:lstStyle/>
+          <a:p>
+            <a:r>
+              <a:rPr lang="pl-PL" sz="7200" b="1" dirty="0">
+                <a:solidFill>
+                  <a:schemeClr val="bg1"/>
+                </a:solidFill>
+                <a:cs typeface="Poppins SemiBold" panose="02000000000000000000" pitchFamily="2" charset="0"/>
+              </a:rPr>
+              <a:t>Wyniki YOLOv2</a:t>
+            </a:r>
+            <a:endParaRPr lang="en-US" sz="7200" b="1" dirty="0">
+              <a:solidFill>
+                <a:schemeClr val="bg1"/>
+              </a:solidFill>
+              <a:cs typeface="Poppins SemiBold" panose="02000000000000000000" pitchFamily="2" charset="0"/>
+            </a:endParaRPr>
+          </a:p>
+        </p:txBody>
+      </p:sp>
+      <p:cxnSp>
+        <p:nvCxnSpPr>
+          <p:cNvPr id="4" name="Straight Connector 3">
+            <a:extLst>
+              <a:ext uri="{FF2B5EF4-FFF2-40B4-BE49-F238E27FC236}">
+                <a16:creationId xmlns:a16="http://schemas.microsoft.com/office/drawing/2014/main" id="{29C6A4DF-FC0B-FC67-B404-5B37400F6E13}"/>
+              </a:ext>
+            </a:extLst>
+          </p:cNvPr>
+          <p:cNvCxnSpPr/>
+          <p:nvPr/>
+        </p:nvCxnSpPr>
+        <p:spPr>
+          <a:xfrm flipH="1">
+            <a:off x="0" y="1007886"/>
+            <a:ext cx="1674813" cy="0"/>
+          </a:xfrm>
+          <a:prstGeom prst="line">
+            <a:avLst/>
+          </a:prstGeom>
+          <a:ln w="76200">
+            <a:solidFill>
+              <a:srgbClr val="FBBA00"/>
+            </a:solidFill>
+          </a:ln>
+        </p:spPr>
+        <p:style>
+          <a:lnRef idx="1">
+            <a:schemeClr val="accent1"/>
+          </a:lnRef>
+          <a:fillRef idx="0">
+            <a:schemeClr val="accent1"/>
+          </a:fillRef>
+          <a:effectRef idx="0">
+            <a:schemeClr val="accent1"/>
+          </a:effectRef>
+          <a:fontRef idx="minor">
+            <a:schemeClr val="tx1"/>
+          </a:fontRef>
+        </p:style>
+      </p:cxnSp>
+      <p:pic>
+        <p:nvPicPr>
+          <p:cNvPr id="3" name="Obraz 2" descr="Obraz zawierający linia, diagram, Wykres, Równolegle&#10;&#10;Opis wygenerowany automatycznie">
+            <a:extLst>
+              <a:ext uri="{FF2B5EF4-FFF2-40B4-BE49-F238E27FC236}">
+                <a16:creationId xmlns:a16="http://schemas.microsoft.com/office/drawing/2014/main" id="{6289964D-C5FD-7A6F-F9A4-A91D81727F4B}"/>
+              </a:ext>
+            </a:extLst>
+          </p:cNvPr>
+          <p:cNvPicPr>
+            <a:picLocks noChangeAspect="1"/>
+          </p:cNvPicPr>
+          <p:nvPr/>
+        </p:nvPicPr>
+        <p:blipFill>
+          <a:blip r:embed="rId3"/>
+          <a:stretch>
+            <a:fillRect/>
+          </a:stretch>
+        </p:blipFill>
+        <p:spPr>
+          <a:xfrm>
+            <a:off x="6679223" y="2016616"/>
+            <a:ext cx="11025554" cy="9682768"/>
+          </a:xfrm>
+          <a:prstGeom prst="rect">
+            <a:avLst/>
+          </a:prstGeom>
+        </p:spPr>
+      </p:pic>
+    </p:spTree>
+    <p:extLst>
+      <p:ext uri="{BB962C8B-B14F-4D97-AF65-F5344CB8AC3E}">
+        <p14:creationId xmlns:p14="http://schemas.microsoft.com/office/powerpoint/2010/main" val="1567917866"/>
+      </p:ext>
+    </p:extLst>
+  </p:cSld>
+  <p:clrMapOvr>
+    <a:masterClrMapping/>
+  </p:clrMapOvr>
+  <mc:AlternateContent xmlns:mc="http://schemas.openxmlformats.org/markup-compatibility/2006">
+    <mc:Choice xmlns:p14="http://schemas.microsoft.com/office/powerpoint/2010/main" Requires="p14">
+      <p:transition p14:dur="10"/>
+    </mc:Choice>
+    <mc:Fallback>
+      <p:transition/>
+    </mc:Fallback>
+  </mc:AlternateContent>
+</p:sld>
+</file>
+
+<file path=ppt/slides/slide24.xml><?xml version="1.0" encoding="utf-8"?>
+<p:sld xmlns:a="http://schemas.openxmlformats.org/drawingml/2006/main" xmlns:r="http://schemas.openxmlformats.org/officeDocument/2006/relationships" xmlns:p="http://schemas.openxmlformats.org/presentationml/2006/main" showMasterSp="0">
+  <p:cSld>
+    <p:bg>
+      <p:bgPr>
+        <a:blipFill dpi="0" rotWithShape="1">
+          <a:blip r:embed="rId2">
+            <a:lum/>
+          </a:blip>
+          <a:srcRect/>
+          <a:stretch>
+            <a:fillRect/>
+          </a:stretch>
+        </a:blipFill>
+        <a:effectLst/>
+      </p:bgPr>
+    </p:bg>
+    <p:spTree>
+      <p:nvGrpSpPr>
+        <p:cNvPr id="1" name="">
+          <a:extLst>
+            <a:ext uri="{FF2B5EF4-FFF2-40B4-BE49-F238E27FC236}">
+              <a16:creationId xmlns:a16="http://schemas.microsoft.com/office/drawing/2014/main" id="{ED5E4889-6FFA-6904-C2E7-F7AD3C0C0E43}"/>
+            </a:ext>
+          </a:extLst>
+        </p:cNvPr>
+        <p:cNvGrpSpPr/>
+        <p:nvPr/>
+      </p:nvGrpSpPr>
+      <p:grpSpPr>
+        <a:xfrm>
+          <a:off x="0" y="0"/>
+          <a:ext cx="0" cy="0"/>
+          <a:chOff x="0" y="0"/>
+          <a:chExt cx="0" cy="0"/>
+        </a:xfrm>
+      </p:grpSpPr>
+      <p:sp>
+        <p:nvSpPr>
+          <p:cNvPr id="2" name="TextBox 1">
+            <a:extLst>
+              <a:ext uri="{FF2B5EF4-FFF2-40B4-BE49-F238E27FC236}">
+                <a16:creationId xmlns:a16="http://schemas.microsoft.com/office/drawing/2014/main" id="{2F2A73B1-FC3B-7C7E-96EB-B4101BE00E49}"/>
+              </a:ext>
+            </a:extLst>
+          </p:cNvPr>
+          <p:cNvSpPr txBox="1"/>
+          <p:nvPr/>
+        </p:nvSpPr>
+        <p:spPr>
+          <a:xfrm>
+            <a:off x="2827292" y="2561209"/>
+            <a:ext cx="15759646" cy="1107996"/>
+          </a:xfrm>
+          <a:prstGeom prst="rect">
+            <a:avLst/>
+          </a:prstGeom>
+          <a:noFill/>
+        </p:spPr>
+        <p:txBody>
+          <a:bodyPr wrap="square" lIns="0" tIns="0" rIns="0" bIns="0" rtlCol="0">
+            <a:spAutoFit/>
+          </a:bodyPr>
+          <a:lstStyle/>
+          <a:p>
+            <a:r>
+              <a:rPr lang="pl-PL" sz="7200" b="1" dirty="0">
+                <a:solidFill>
+                  <a:schemeClr val="bg1"/>
+                </a:solidFill>
+                <a:cs typeface="Poppins SemiBold" panose="02000000000000000000" pitchFamily="2" charset="0"/>
+              </a:rPr>
+              <a:t>Wyniki YOLOv2</a:t>
+            </a:r>
+            <a:endParaRPr lang="en-US" sz="7200" b="1" dirty="0">
+              <a:solidFill>
+                <a:schemeClr val="bg1"/>
+              </a:solidFill>
+              <a:cs typeface="Poppins SemiBold" panose="02000000000000000000" pitchFamily="2" charset="0"/>
+            </a:endParaRPr>
+          </a:p>
+        </p:txBody>
+      </p:sp>
+      <p:cxnSp>
+        <p:nvCxnSpPr>
+          <p:cNvPr id="4" name="Straight Connector 3">
+            <a:extLst>
+              <a:ext uri="{FF2B5EF4-FFF2-40B4-BE49-F238E27FC236}">
+                <a16:creationId xmlns:a16="http://schemas.microsoft.com/office/drawing/2014/main" id="{3C31E18C-EC47-A252-406A-CCEFAEA10F51}"/>
+              </a:ext>
+            </a:extLst>
+          </p:cNvPr>
+          <p:cNvCxnSpPr/>
+          <p:nvPr/>
+        </p:nvCxnSpPr>
+        <p:spPr>
+          <a:xfrm flipH="1">
+            <a:off x="0" y="3135631"/>
+            <a:ext cx="1674813" cy="0"/>
+          </a:xfrm>
+          <a:prstGeom prst="line">
+            <a:avLst/>
+          </a:prstGeom>
+          <a:ln w="76200">
+            <a:solidFill>
+              <a:srgbClr val="FBBA00"/>
+            </a:solidFill>
+          </a:ln>
+        </p:spPr>
+        <p:style>
+          <a:lnRef idx="1">
+            <a:schemeClr val="accent1"/>
+          </a:lnRef>
+          <a:fillRef idx="0">
+            <a:schemeClr val="accent1"/>
+          </a:fillRef>
+          <a:effectRef idx="0">
+            <a:schemeClr val="accent1"/>
+          </a:effectRef>
+          <a:fontRef idx="minor">
+            <a:schemeClr val="tx1"/>
+          </a:fontRef>
+        </p:style>
+      </p:cxnSp>
+      <p:sp>
+        <p:nvSpPr>
+          <p:cNvPr id="5" name="TextBox 4">
+            <a:extLst>
+              <a:ext uri="{FF2B5EF4-FFF2-40B4-BE49-F238E27FC236}">
+                <a16:creationId xmlns:a16="http://schemas.microsoft.com/office/drawing/2014/main" id="{4252438B-013D-34D4-544D-A35421E2F4A9}"/>
+              </a:ext>
+            </a:extLst>
+          </p:cNvPr>
+          <p:cNvSpPr txBox="1"/>
+          <p:nvPr/>
+        </p:nvSpPr>
+        <p:spPr>
+          <a:xfrm>
+            <a:off x="2827293" y="6610178"/>
+            <a:ext cx="19880307" cy="3908762"/>
+          </a:xfrm>
+          <a:prstGeom prst="rect">
+            <a:avLst/>
+          </a:prstGeom>
+          <a:noFill/>
+        </p:spPr>
+        <p:txBody>
+          <a:bodyPr wrap="square" lIns="0" tIns="0" rIns="0" bIns="0" rtlCol="0">
+            <a:spAutoFit/>
+          </a:bodyPr>
+          <a:lstStyle/>
+          <a:p>
+            <a:pPr>
+              <a:spcAft>
+                <a:spcPts val="3600"/>
+              </a:spcAft>
+            </a:pPr>
+            <a:r>
+              <a:rPr lang="pl-PL" sz="3200" dirty="0">
+                <a:solidFill>
+                  <a:schemeClr val="bg1"/>
+                </a:solidFill>
+                <a:latin typeface="+mj-lt"/>
+                <a:cs typeface="Poppins" panose="02000000000000000000" pitchFamily="2" charset="0"/>
+              </a:rPr>
+              <a:t>Poza użyciem wskaźnika precyzji predykcji wykorzystano typową metodę oceny wykrywania i rozpoznawania znaków, tj. użycie zbioru testowego i ocena każdego zdjęcia z osobna. W trakcie prac nad modelem oprócz detekcji znaku dodano również jego rozpoznawanie, a więc w teście sprawdzano, czy jedynie znaki A-7 posiadają swój </a:t>
+            </a:r>
+            <a:r>
+              <a:rPr lang="pl-PL" sz="3200" dirty="0" err="1">
+                <a:solidFill>
+                  <a:schemeClr val="bg1"/>
+                </a:solidFill>
+                <a:latin typeface="+mj-lt"/>
+                <a:cs typeface="Poppins" panose="02000000000000000000" pitchFamily="2" charset="0"/>
+              </a:rPr>
+              <a:t>bounding-box</a:t>
+            </a:r>
+            <a:r>
+              <a:rPr lang="pl-PL" sz="3200" dirty="0">
+                <a:solidFill>
+                  <a:schemeClr val="bg1"/>
+                </a:solidFill>
+                <a:latin typeface="+mj-lt"/>
+                <a:cs typeface="Poppins" panose="02000000000000000000" pitchFamily="2" charset="0"/>
+              </a:rPr>
+              <a:t>. Do przygotowanego wcześniej zbioru testowego dołożono dwa zdjęcia testowe od Prowadzącego takie, że na jednym zdjęciu znajdował się jeden znak A-7 oraz jeden inny znak, natomiast na drugim zdjęciu znajdowały się dwa znaki inne niż znak A-7.</a:t>
+            </a:r>
+          </a:p>
+          <a:p>
+            <a:pPr>
+              <a:spcAft>
+                <a:spcPts val="3600"/>
+              </a:spcAft>
+            </a:pPr>
+            <a:r>
+              <a:rPr lang="pl-PL" sz="3200" dirty="0">
+                <a:solidFill>
+                  <a:schemeClr val="bg1"/>
+                </a:solidFill>
+                <a:latin typeface="+mj-lt"/>
+                <a:cs typeface="Poppins" panose="02000000000000000000" pitchFamily="2" charset="0"/>
+              </a:rPr>
+              <a:t>Model YOLO prawidłowo wykrył i rozpoznał znaki dla wszystkich zdjęć testowych, również zdjęć od Prowadzącego.</a:t>
+            </a:r>
+          </a:p>
+        </p:txBody>
+      </p:sp>
+    </p:spTree>
+    <p:extLst>
+      <p:ext uri="{BB962C8B-B14F-4D97-AF65-F5344CB8AC3E}">
+        <p14:creationId xmlns:p14="http://schemas.microsoft.com/office/powerpoint/2010/main" val="1183260986"/>
+      </p:ext>
+    </p:extLst>
+  </p:cSld>
+  <p:clrMapOvr>
+    <a:masterClrMapping/>
+  </p:clrMapOvr>
+  <mc:AlternateContent xmlns:mc="http://schemas.openxmlformats.org/markup-compatibility/2006">
+    <mc:Choice xmlns:p14="http://schemas.microsoft.com/office/powerpoint/2010/main" Requires="p14">
+      <p:transition p14:dur="10"/>
+    </mc:Choice>
+    <mc:Fallback>
+      <p:transition/>
+    </mc:Fallback>
+  </mc:AlternateContent>
+</p:sld>
+</file>
+
+<file path=ppt/slides/slide25.xml><?xml version="1.0" encoding="utf-8"?>
+<p:sld xmlns:a="http://schemas.openxmlformats.org/drawingml/2006/main" xmlns:r="http://schemas.openxmlformats.org/officeDocument/2006/relationships" xmlns:p="http://schemas.openxmlformats.org/presentationml/2006/main" showMasterSp="0">
+  <p:cSld>
+    <p:bg>
+      <p:bgPr>
+        <a:blipFill dpi="0" rotWithShape="1">
+          <a:blip r:embed="rId2">
+            <a:lum/>
+          </a:blip>
+          <a:srcRect/>
+          <a:stretch>
+            <a:fillRect/>
+          </a:stretch>
+        </a:blipFill>
+        <a:effectLst/>
+      </p:bgPr>
+    </p:bg>
+    <p:spTree>
+      <p:nvGrpSpPr>
+        <p:cNvPr id="1" name="">
+          <a:extLst>
+            <a:ext uri="{FF2B5EF4-FFF2-40B4-BE49-F238E27FC236}">
+              <a16:creationId xmlns:a16="http://schemas.microsoft.com/office/drawing/2014/main" id="{17866C2E-286A-36F6-E439-8D6A89A1CE1E}"/>
+            </a:ext>
+          </a:extLst>
+        </p:cNvPr>
+        <p:cNvGrpSpPr/>
+        <p:nvPr/>
+      </p:nvGrpSpPr>
+      <p:grpSpPr>
+        <a:xfrm>
+          <a:off x="0" y="0"/>
+          <a:ext cx="0" cy="0"/>
+          <a:chOff x="0" y="0"/>
+          <a:chExt cx="0" cy="0"/>
+        </a:xfrm>
+      </p:grpSpPr>
+      <p:sp>
+        <p:nvSpPr>
+          <p:cNvPr id="2" name="TextBox 1">
+            <a:extLst>
+              <a:ext uri="{FF2B5EF4-FFF2-40B4-BE49-F238E27FC236}">
+                <a16:creationId xmlns:a16="http://schemas.microsoft.com/office/drawing/2014/main" id="{714A2D44-EBD0-2440-BB09-BC71ED93A44F}"/>
+              </a:ext>
+            </a:extLst>
+          </p:cNvPr>
+          <p:cNvSpPr txBox="1"/>
+          <p:nvPr/>
+        </p:nvSpPr>
+        <p:spPr>
+          <a:xfrm>
+            <a:off x="2827292" y="433469"/>
+            <a:ext cx="15759646" cy="1107996"/>
+          </a:xfrm>
+          <a:prstGeom prst="rect">
+            <a:avLst/>
+          </a:prstGeom>
+          <a:noFill/>
+        </p:spPr>
+        <p:txBody>
+          <a:bodyPr wrap="square" lIns="0" tIns="0" rIns="0" bIns="0" rtlCol="0">
+            <a:spAutoFit/>
+          </a:bodyPr>
+          <a:lstStyle/>
+          <a:p>
+            <a:r>
+              <a:rPr lang="pl-PL" sz="7200" b="1" dirty="0">
+                <a:solidFill>
+                  <a:schemeClr val="bg1"/>
+                </a:solidFill>
+                <a:cs typeface="Poppins SemiBold" panose="02000000000000000000" pitchFamily="2" charset="0"/>
+              </a:rPr>
+              <a:t>Wyniki YOLOv2</a:t>
+            </a:r>
+            <a:endParaRPr lang="en-US" sz="7200" b="1" dirty="0">
+              <a:solidFill>
+                <a:schemeClr val="bg1"/>
+              </a:solidFill>
+              <a:cs typeface="Poppins SemiBold" panose="02000000000000000000" pitchFamily="2" charset="0"/>
+            </a:endParaRPr>
+          </a:p>
+        </p:txBody>
+      </p:sp>
+      <p:cxnSp>
+        <p:nvCxnSpPr>
+          <p:cNvPr id="4" name="Straight Connector 3">
+            <a:extLst>
+              <a:ext uri="{FF2B5EF4-FFF2-40B4-BE49-F238E27FC236}">
+                <a16:creationId xmlns:a16="http://schemas.microsoft.com/office/drawing/2014/main" id="{F92D3137-2752-D718-4B26-FEB6A9807B8D}"/>
+              </a:ext>
+            </a:extLst>
+          </p:cNvPr>
+          <p:cNvCxnSpPr/>
+          <p:nvPr/>
+        </p:nvCxnSpPr>
+        <p:spPr>
+          <a:xfrm flipH="1">
+            <a:off x="0" y="1007891"/>
+            <a:ext cx="1674813" cy="0"/>
+          </a:xfrm>
+          <a:prstGeom prst="line">
+            <a:avLst/>
+          </a:prstGeom>
+          <a:ln w="76200">
+            <a:solidFill>
+              <a:srgbClr val="FBBA00"/>
+            </a:solidFill>
+          </a:ln>
+        </p:spPr>
+        <p:style>
+          <a:lnRef idx="1">
+            <a:schemeClr val="accent1"/>
+          </a:lnRef>
+          <a:fillRef idx="0">
+            <a:schemeClr val="accent1"/>
+          </a:fillRef>
+          <a:effectRef idx="0">
+            <a:schemeClr val="accent1"/>
+          </a:effectRef>
+          <a:fontRef idx="minor">
+            <a:schemeClr val="tx1"/>
+          </a:fontRef>
+        </p:style>
+      </p:cxnSp>
+      <p:pic>
+        <p:nvPicPr>
+          <p:cNvPr id="3" name="Obraz 2" descr="Obraz zawierający tekst, na wolnym powietrzu, niebo, drzewo&#10;&#10;Opis wygenerowany automatycznie">
+            <a:extLst>
+              <a:ext uri="{FF2B5EF4-FFF2-40B4-BE49-F238E27FC236}">
+                <a16:creationId xmlns:a16="http://schemas.microsoft.com/office/drawing/2014/main" id="{BC89FB36-D75D-C10C-78AC-E5104D71ECE8}"/>
+              </a:ext>
+            </a:extLst>
+          </p:cNvPr>
+          <p:cNvPicPr>
+            <a:picLocks noChangeAspect="1"/>
+          </p:cNvPicPr>
+          <p:nvPr/>
+        </p:nvPicPr>
+        <p:blipFill>
+          <a:blip r:embed="rId3">
+            <a:extLst>
+              <a:ext uri="{28A0092B-C50C-407E-A947-70E740481C1C}">
+                <a14:useLocalDpi xmlns:a14="http://schemas.microsoft.com/office/drawing/2010/main" val="0"/>
+              </a:ext>
+            </a:extLst>
+          </a:blip>
+          <a:stretch>
+            <a:fillRect/>
+          </a:stretch>
+        </p:blipFill>
+        <p:spPr>
+          <a:xfrm>
+            <a:off x="3456574" y="2629857"/>
+            <a:ext cx="8456285" cy="8437441"/>
+          </a:xfrm>
+          <a:prstGeom prst="rect">
+            <a:avLst/>
+          </a:prstGeom>
+        </p:spPr>
+      </p:pic>
+      <p:pic>
+        <p:nvPicPr>
+          <p:cNvPr id="6" name="Obraz 5" descr="Obraz zawierający na wolnym powietrzu, niebo, Znak drogowy, chmura&#10;&#10;Opis wygenerowany automatycznie">
+            <a:extLst>
+              <a:ext uri="{FF2B5EF4-FFF2-40B4-BE49-F238E27FC236}">
+                <a16:creationId xmlns:a16="http://schemas.microsoft.com/office/drawing/2014/main" id="{D52F545B-45B6-E552-5833-603674DE82D2}"/>
+              </a:ext>
+            </a:extLst>
+          </p:cNvPr>
+          <p:cNvPicPr>
+            <a:picLocks noChangeAspect="1"/>
+          </p:cNvPicPr>
+          <p:nvPr/>
+        </p:nvPicPr>
+        <p:blipFill>
+          <a:blip r:embed="rId4">
+            <a:extLst>
+              <a:ext uri="{28A0092B-C50C-407E-A947-70E740481C1C}">
+                <a14:useLocalDpi xmlns:a14="http://schemas.microsoft.com/office/drawing/2010/main" val="0"/>
+              </a:ext>
+            </a:extLst>
+          </a:blip>
+          <a:stretch>
+            <a:fillRect/>
+          </a:stretch>
+        </p:blipFill>
+        <p:spPr>
+          <a:xfrm>
+            <a:off x="12192000" y="2629857"/>
+            <a:ext cx="8456285" cy="8456285"/>
+          </a:xfrm>
+          <a:prstGeom prst="rect">
+            <a:avLst/>
+          </a:prstGeom>
+        </p:spPr>
+      </p:pic>
+    </p:spTree>
+    <p:extLst>
+      <p:ext uri="{BB962C8B-B14F-4D97-AF65-F5344CB8AC3E}">
+        <p14:creationId xmlns:p14="http://schemas.microsoft.com/office/powerpoint/2010/main" val="377812049"/>
+      </p:ext>
+    </p:extLst>
+  </p:cSld>
+  <p:clrMapOvr>
+    <a:masterClrMapping/>
+  </p:clrMapOvr>
+  <mc:AlternateContent xmlns:mc="http://schemas.openxmlformats.org/markup-compatibility/2006">
+    <mc:Choice xmlns:p14="http://schemas.microsoft.com/office/powerpoint/2010/main" Requires="p14">
+      <p:transition p14:dur="10"/>
+    </mc:Choice>
+    <mc:Fallback>
       <p:transition/>
     </mc:Fallback>
   </mc:AlternateContent>
@@ -13179,7 +15242,27 @@
                 <a:latin typeface="+mj-lt"/>
                 <a:cs typeface="Poppins" panose="02000000000000000000" pitchFamily="2" charset="0"/>
               </a:rPr>
-              <a:t>Ze względu na możliwość użycia jednego z dwóch zbiorów danych oraz złożoności projektu, prace rozpoczęto od przygotowania sieci do rozpoznawania znaków. Zbiór ten składał się ze zdjęć wyłącznie pojedynczych znaków drogowych o niskiej rozdzielczości. Opracowano sieć o dwunastu warstwach oraz przygotowano zbiór danych tak, że ujednolicono ich rozmiar oraz wymieszano zdjęcia, aby osiągnąć jak najlepszą generalizację procesu uczenia.</a:t>
+              <a:t>Ze względu na możliwość użycia jednego z dwóch zbiorów danych oraz złożoności projektu, prace rozpoczęto od przygotowania sieci do rozpoznawania znaków. Zbiór ten składał się ze zdjęć wyłącznie pojedynczych znaków drogowych o</a:t>
+            </a:r>
+            <a:r>
+              <a:rPr lang="pl-PL" sz="3200" dirty="0">
+                <a:solidFill>
+                  <a:schemeClr val="bg1"/>
+                </a:solidFill>
+                <a:latin typeface="Calibri" panose="020F0502020204030204" pitchFamily="34" charset="0"/>
+                <a:cs typeface="Calibri" panose="020F0502020204030204" pitchFamily="34" charset="0"/>
+              </a:rPr>
+              <a:t> </a:t>
+            </a:r>
+            <a:r>
+              <a:rPr lang="pl-PL" sz="3200" dirty="0">
+                <a:solidFill>
+                  <a:schemeClr val="bg1"/>
+                </a:solidFill>
+                <a:latin typeface="+mj-lt"/>
+                <a:cs typeface="Poppins" panose="02000000000000000000" pitchFamily="2" charset="0"/>
+              </a:rPr>
+              <a:t>niskiej rozdzielczości. Opracowano sieć o dwunastu warstwach oraz przygotowano zbiór danych tak, że ujednolicono ich rozmiar oraz wymieszano zdjęcia, aby osiągnąć jak najlepszą generalizację procesu uczenia.</a:t>
             </a:r>
           </a:p>
         </p:txBody>

</xml_diff>